<commit_message>
Add details of presentation completed so far
</commit_message>
<xml_diff>
--- a/Presentation.pptx
+++ b/Presentation.pptx
@@ -11,6 +11,7 @@
     <p:sldId id="257" r:id="rId5"/>
     <p:sldId id="258" r:id="rId6"/>
     <p:sldId id="259" r:id="rId7"/>
+    <p:sldId id="260" r:id="rId8"/>
   </p:sldIdLst>
   <p:sldSz cx="9144000" cy="6858000" type="screen4x3"/>
   <p:notesSz cx="6858000" cy="9144000"/>
@@ -17366,6 +17367,99 @@
 </p:sld>
 </file>
 
+<file path=ppt/slides/slide5.xml><?xml version="1.0" encoding="utf-8"?>
+<p:sld xmlns:a="http://schemas.openxmlformats.org/drawingml/2006/main" xmlns:r="http://schemas.openxmlformats.org/officeDocument/2006/relationships" xmlns:p="http://schemas.openxmlformats.org/presentationml/2006/main">
+  <p:cSld>
+    <p:spTree>
+      <p:nvGrpSpPr>
+        <p:cNvPr id="1" name=""/>
+        <p:cNvGrpSpPr/>
+        <p:nvPr/>
+      </p:nvGrpSpPr>
+      <p:grpSpPr>
+        <a:xfrm>
+          <a:off x="0" y="0"/>
+          <a:ext cx="0" cy="0"/>
+          <a:chOff x="0" y="0"/>
+          <a:chExt cx="0" cy="0"/>
+        </a:xfrm>
+      </p:grpSpPr>
+      <p:sp>
+        <p:nvSpPr>
+          <p:cNvPr id="2" name="Title 1"/>
+          <p:cNvSpPr>
+            <a:spLocks noGrp="1"/>
+          </p:cNvSpPr>
+          <p:nvPr>
+            <p:ph type="title"/>
+          </p:nvPr>
+        </p:nvSpPr>
+        <p:spPr/>
+        <p:txBody>
+          <a:bodyPr/>
+          <a:lstStyle/>
+          <a:p>
+            <a:pPr algn="ctr"/>
+            <a:r>
+              <a:rPr lang="en-US" dirty="0" smtClean="0"/>
+              <a:t>Block Structure</a:t>
+            </a:r>
+            <a:endParaRPr lang="en-IN" dirty="0"/>
+          </a:p>
+        </p:txBody>
+      </p:sp>
+      <p:pic>
+        <p:nvPicPr>
+          <p:cNvPr id="1026" name="Picture 2" descr="C:\Users\Dits\Desktop\biconnected.png"/>
+          <p:cNvPicPr>
+            <a:picLocks noChangeAspect="1" noChangeArrowheads="1"/>
+          </p:cNvPicPr>
+          <p:nvPr/>
+        </p:nvPicPr>
+        <p:blipFill>
+          <a:blip r:embed="rId2" cstate="print">
+            <a:clrChange>
+              <a:clrFrom>
+                <a:srgbClr val="FFFFFF"/>
+              </a:clrFrom>
+              <a:clrTo>
+                <a:srgbClr val="FFFFFF">
+                  <a:alpha val="0"/>
+                </a:srgbClr>
+              </a:clrTo>
+            </a:clrChange>
+          </a:blip>
+          <a:srcRect/>
+          <a:stretch>
+            <a:fillRect/>
+          </a:stretch>
+        </p:blipFill>
+        <p:spPr bwMode="auto">
+          <a:xfrm>
+            <a:off x="2209800" y="1676400"/>
+            <a:ext cx="4905375" cy="4844514"/>
+          </a:xfrm>
+          <a:prstGeom prst="rect">
+            <a:avLst/>
+          </a:prstGeom>
+          <a:noFill/>
+        </p:spPr>
+      </p:pic>
+    </p:spTree>
+  </p:cSld>
+  <p:clrMapOvr>
+    <a:masterClrMapping/>
+  </p:clrMapOvr>
+  <p:timing>
+    <p:tnLst>
+      <p:par>
+        <p:cTn id="1" dur="indefinite" restart="never" nodeType="tmRoot"/>
+      </p:par>
+    </p:tnLst>
+  </p:timing>
+</p:sld>
+</file>
+
 <file path=ppt/theme/theme1.xml><?xml version="1.0" encoding="utf-8"?>
 <a:theme xmlns:a="http://schemas.openxmlformats.org/drawingml/2006/main" name="Solstice">
   <a:themeElements>

</xml_diff>

<commit_message>
Add explanation for DFS
</commit_message>
<xml_diff>
--- a/Presentation.pptx
+++ b/Presentation.pptx
@@ -12,6 +12,7 @@
     <p:sldId id="258" r:id="rId6"/>
     <p:sldId id="259" r:id="rId7"/>
     <p:sldId id="260" r:id="rId8"/>
+    <p:sldId id="261" r:id="rId9"/>
   </p:sldIdLst>
   <p:sldSz cx="9144000" cy="6858000" type="screen4x3"/>
   <p:notesSz cx="6858000" cy="9144000"/>
@@ -17460,6 +17461,3197 @@
 </p:sld>
 </file>
 
+<file path=ppt/slides/slide6.xml><?xml version="1.0" encoding="utf-8"?>
+<p:sld xmlns:a="http://schemas.openxmlformats.org/drawingml/2006/main" xmlns:r="http://schemas.openxmlformats.org/officeDocument/2006/relationships" xmlns:p="http://schemas.openxmlformats.org/presentationml/2006/main">
+  <p:cSld>
+    <p:spTree>
+      <p:nvGrpSpPr>
+        <p:cNvPr id="1" name=""/>
+        <p:cNvGrpSpPr/>
+        <p:nvPr/>
+      </p:nvGrpSpPr>
+      <p:grpSpPr>
+        <a:xfrm>
+          <a:off x="0" y="0"/>
+          <a:ext cx="0" cy="0"/>
+          <a:chOff x="0" y="0"/>
+          <a:chExt cx="0" cy="0"/>
+        </a:xfrm>
+      </p:grpSpPr>
+      <p:sp>
+        <p:nvSpPr>
+          <p:cNvPr id="2" name="Title 1"/>
+          <p:cNvSpPr>
+            <a:spLocks noGrp="1"/>
+          </p:cNvSpPr>
+          <p:nvPr>
+            <p:ph type="title"/>
+          </p:nvPr>
+        </p:nvSpPr>
+        <p:spPr/>
+        <p:txBody>
+          <a:bodyPr/>
+          <a:lstStyle/>
+          <a:p>
+            <a:r>
+              <a:rPr lang="en-US" dirty="0" smtClean="0"/>
+              <a:t>Depth-First Search</a:t>
+            </a:r>
+            <a:endParaRPr lang="en-IN" dirty="0"/>
+          </a:p>
+        </p:txBody>
+      </p:sp>
+      <p:sp>
+        <p:nvSpPr>
+          <p:cNvPr id="4" name="Oval 3"/>
+          <p:cNvSpPr/>
+          <p:nvPr/>
+        </p:nvSpPr>
+        <p:spPr>
+          <a:xfrm>
+            <a:off x="3276600" y="1828800"/>
+            <a:ext cx="914400" cy="914400"/>
+          </a:xfrm>
+          <a:prstGeom prst="ellipse">
+            <a:avLst/>
+          </a:prstGeom>
+          <a:ln>
+            <a:noFill/>
+          </a:ln>
+          <a:effectLst>
+            <a:outerShdw blurRad="44450" dist="27940" dir="5400000" algn="ctr">
+              <a:srgbClr val="000000">
+                <a:alpha val="32000"/>
+              </a:srgbClr>
+            </a:outerShdw>
+          </a:effectLst>
+          <a:scene3d>
+            <a:camera prst="orthographicFront">
+              <a:rot lat="0" lon="0" rev="0"/>
+            </a:camera>
+            <a:lightRig rig="balanced" dir="t">
+              <a:rot lat="0" lon="0" rev="8700000"/>
+            </a:lightRig>
+          </a:scene3d>
+          <a:sp3d>
+            <a:bevelT w="190500" h="38100"/>
+          </a:sp3d>
+        </p:spPr>
+        <p:style>
+          <a:lnRef idx="2">
+            <a:schemeClr val="accent1">
+              <a:shade val="50000"/>
+            </a:schemeClr>
+          </a:lnRef>
+          <a:fillRef idx="1">
+            <a:schemeClr val="accent1"/>
+          </a:fillRef>
+          <a:effectRef idx="0">
+            <a:schemeClr val="accent1"/>
+          </a:effectRef>
+          <a:fontRef idx="minor">
+            <a:schemeClr val="lt1"/>
+          </a:fontRef>
+        </p:style>
+        <p:txBody>
+          <a:bodyPr rtlCol="0" anchor="ctr"/>
+          <a:lstStyle/>
+          <a:p>
+            <a:pPr algn="ctr"/>
+            <a:endParaRPr lang="en-IN" sz="2400" b="1" spc="50" dirty="0">
+              <a:ln w="12700" cmpd="sng">
+                <a:solidFill>
+                  <a:schemeClr val="accent6">
+                    <a:satMod val="120000"/>
+                    <a:shade val="80000"/>
+                  </a:schemeClr>
+                </a:solidFill>
+                <a:prstDash val="solid"/>
+              </a:ln>
+              <a:solidFill>
+                <a:schemeClr val="accent6">
+                  <a:tint val="1000"/>
+                </a:schemeClr>
+              </a:solidFill>
+              <a:effectLst>
+                <a:glow rad="53100">
+                  <a:schemeClr val="accent6">
+                    <a:satMod val="180000"/>
+                    <a:alpha val="30000"/>
+                  </a:schemeClr>
+                </a:glow>
+              </a:effectLst>
+            </a:endParaRPr>
+          </a:p>
+        </p:txBody>
+      </p:sp>
+      <p:sp>
+        <p:nvSpPr>
+          <p:cNvPr id="5" name="Oval 4"/>
+          <p:cNvSpPr/>
+          <p:nvPr/>
+        </p:nvSpPr>
+        <p:spPr>
+          <a:xfrm>
+            <a:off x="5029200" y="5638800"/>
+            <a:ext cx="914400" cy="914400"/>
+          </a:xfrm>
+          <a:prstGeom prst="ellipse">
+            <a:avLst/>
+          </a:prstGeom>
+          <a:ln>
+            <a:noFill/>
+          </a:ln>
+          <a:effectLst>
+            <a:outerShdw blurRad="44450" dist="27940" dir="5400000" algn="ctr">
+              <a:srgbClr val="000000">
+                <a:alpha val="32000"/>
+              </a:srgbClr>
+            </a:outerShdw>
+          </a:effectLst>
+          <a:scene3d>
+            <a:camera prst="orthographicFront">
+              <a:rot lat="0" lon="0" rev="0"/>
+            </a:camera>
+            <a:lightRig rig="balanced" dir="t">
+              <a:rot lat="0" lon="0" rev="8700000"/>
+            </a:lightRig>
+          </a:scene3d>
+          <a:sp3d>
+            <a:bevelT w="190500" h="38100"/>
+          </a:sp3d>
+        </p:spPr>
+        <p:style>
+          <a:lnRef idx="2">
+            <a:schemeClr val="accent1">
+              <a:shade val="50000"/>
+            </a:schemeClr>
+          </a:lnRef>
+          <a:fillRef idx="1">
+            <a:schemeClr val="accent1"/>
+          </a:fillRef>
+          <a:effectRef idx="0">
+            <a:schemeClr val="accent1"/>
+          </a:effectRef>
+          <a:fontRef idx="minor">
+            <a:schemeClr val="lt1"/>
+          </a:fontRef>
+        </p:style>
+        <p:txBody>
+          <a:bodyPr rtlCol="0" anchor="ctr"/>
+          <a:lstStyle/>
+          <a:p>
+            <a:pPr algn="ctr"/>
+            <a:endParaRPr lang="en-US" sz="2400" b="1" spc="50" dirty="0" smtClean="0">
+              <a:ln w="12700" cmpd="sng">
+                <a:solidFill>
+                  <a:schemeClr val="accent6">
+                    <a:satMod val="120000"/>
+                    <a:shade val="80000"/>
+                  </a:schemeClr>
+                </a:solidFill>
+                <a:prstDash val="solid"/>
+              </a:ln>
+              <a:solidFill>
+                <a:schemeClr val="accent6">
+                  <a:tint val="1000"/>
+                </a:schemeClr>
+              </a:solidFill>
+              <a:effectLst>
+                <a:glow rad="53100">
+                  <a:schemeClr val="accent6">
+                    <a:satMod val="180000"/>
+                    <a:alpha val="30000"/>
+                  </a:schemeClr>
+                </a:glow>
+              </a:effectLst>
+            </a:endParaRPr>
+          </a:p>
+        </p:txBody>
+      </p:sp>
+      <p:sp>
+        <p:nvSpPr>
+          <p:cNvPr id="6" name="Oval 5"/>
+          <p:cNvSpPr/>
+          <p:nvPr/>
+        </p:nvSpPr>
+        <p:spPr>
+          <a:xfrm>
+            <a:off x="7620000" y="5562600"/>
+            <a:ext cx="914400" cy="914400"/>
+          </a:xfrm>
+          <a:prstGeom prst="ellipse">
+            <a:avLst/>
+          </a:prstGeom>
+          <a:ln>
+            <a:noFill/>
+          </a:ln>
+          <a:effectLst>
+            <a:outerShdw blurRad="44450" dist="27940" dir="5400000" algn="ctr">
+              <a:srgbClr val="000000">
+                <a:alpha val="32000"/>
+              </a:srgbClr>
+            </a:outerShdw>
+          </a:effectLst>
+          <a:scene3d>
+            <a:camera prst="orthographicFront">
+              <a:rot lat="0" lon="0" rev="0"/>
+            </a:camera>
+            <a:lightRig rig="balanced" dir="t">
+              <a:rot lat="0" lon="0" rev="8700000"/>
+            </a:lightRig>
+          </a:scene3d>
+          <a:sp3d>
+            <a:bevelT w="190500" h="38100"/>
+          </a:sp3d>
+        </p:spPr>
+        <p:style>
+          <a:lnRef idx="2">
+            <a:schemeClr val="accent1">
+              <a:shade val="50000"/>
+            </a:schemeClr>
+          </a:lnRef>
+          <a:fillRef idx="1">
+            <a:schemeClr val="accent1"/>
+          </a:fillRef>
+          <a:effectRef idx="0">
+            <a:schemeClr val="accent1"/>
+          </a:effectRef>
+          <a:fontRef idx="minor">
+            <a:schemeClr val="lt1"/>
+          </a:fontRef>
+        </p:style>
+        <p:txBody>
+          <a:bodyPr rtlCol="0" anchor="ctr"/>
+          <a:lstStyle/>
+          <a:p>
+            <a:pPr algn="ctr"/>
+            <a:endParaRPr lang="en-US" sz="2400" b="1" spc="50" dirty="0" smtClean="0">
+              <a:ln w="12700" cmpd="sng">
+                <a:solidFill>
+                  <a:schemeClr val="accent6">
+                    <a:satMod val="120000"/>
+                    <a:shade val="80000"/>
+                  </a:schemeClr>
+                </a:solidFill>
+                <a:prstDash val="solid"/>
+              </a:ln>
+              <a:solidFill>
+                <a:schemeClr val="accent6">
+                  <a:tint val="1000"/>
+                </a:schemeClr>
+              </a:solidFill>
+              <a:effectLst>
+                <a:glow rad="53100">
+                  <a:schemeClr val="accent6">
+                    <a:satMod val="180000"/>
+                    <a:alpha val="30000"/>
+                  </a:schemeClr>
+                </a:glow>
+              </a:effectLst>
+            </a:endParaRPr>
+          </a:p>
+        </p:txBody>
+      </p:sp>
+      <p:sp>
+        <p:nvSpPr>
+          <p:cNvPr id="7" name="Oval 6"/>
+          <p:cNvSpPr/>
+          <p:nvPr/>
+        </p:nvSpPr>
+        <p:spPr>
+          <a:xfrm>
+            <a:off x="1676400" y="2286000"/>
+            <a:ext cx="914400" cy="914400"/>
+          </a:xfrm>
+          <a:prstGeom prst="ellipse">
+            <a:avLst/>
+          </a:prstGeom>
+          <a:ln>
+            <a:noFill/>
+          </a:ln>
+          <a:effectLst>
+            <a:outerShdw blurRad="44450" dist="27940" dir="5400000" algn="ctr">
+              <a:srgbClr val="000000">
+                <a:alpha val="32000"/>
+              </a:srgbClr>
+            </a:outerShdw>
+          </a:effectLst>
+          <a:scene3d>
+            <a:camera prst="orthographicFront">
+              <a:rot lat="0" lon="0" rev="0"/>
+            </a:camera>
+            <a:lightRig rig="balanced" dir="t">
+              <a:rot lat="0" lon="0" rev="8700000"/>
+            </a:lightRig>
+          </a:scene3d>
+          <a:sp3d>
+            <a:bevelT w="190500" h="38100"/>
+          </a:sp3d>
+        </p:spPr>
+        <p:style>
+          <a:lnRef idx="2">
+            <a:schemeClr val="accent1">
+              <a:shade val="50000"/>
+            </a:schemeClr>
+          </a:lnRef>
+          <a:fillRef idx="1">
+            <a:schemeClr val="accent1"/>
+          </a:fillRef>
+          <a:effectRef idx="0">
+            <a:schemeClr val="accent1"/>
+          </a:effectRef>
+          <a:fontRef idx="minor">
+            <a:schemeClr val="lt1"/>
+          </a:fontRef>
+        </p:style>
+        <p:txBody>
+          <a:bodyPr rtlCol="0" anchor="ctr"/>
+          <a:lstStyle/>
+          <a:p>
+            <a:pPr algn="ctr"/>
+            <a:endParaRPr lang="en-IN" sz="2400" b="1" spc="50" dirty="0">
+              <a:ln w="12700" cmpd="sng">
+                <a:solidFill>
+                  <a:schemeClr val="accent6">
+                    <a:satMod val="120000"/>
+                    <a:shade val="80000"/>
+                  </a:schemeClr>
+                </a:solidFill>
+                <a:prstDash val="solid"/>
+              </a:ln>
+              <a:solidFill>
+                <a:schemeClr val="accent6">
+                  <a:tint val="1000"/>
+                </a:schemeClr>
+              </a:solidFill>
+              <a:effectLst>
+                <a:glow rad="53100">
+                  <a:schemeClr val="accent6">
+                    <a:satMod val="180000"/>
+                    <a:alpha val="30000"/>
+                  </a:schemeClr>
+                </a:glow>
+              </a:effectLst>
+            </a:endParaRPr>
+          </a:p>
+        </p:txBody>
+      </p:sp>
+      <p:sp>
+        <p:nvSpPr>
+          <p:cNvPr id="8" name="Oval 7"/>
+          <p:cNvSpPr/>
+          <p:nvPr/>
+        </p:nvSpPr>
+        <p:spPr>
+          <a:xfrm>
+            <a:off x="2514600" y="3886200"/>
+            <a:ext cx="914400" cy="914400"/>
+          </a:xfrm>
+          <a:prstGeom prst="ellipse">
+            <a:avLst/>
+          </a:prstGeom>
+          <a:ln>
+            <a:noFill/>
+          </a:ln>
+          <a:effectLst>
+            <a:outerShdw blurRad="44450" dist="27940" dir="5400000" algn="ctr">
+              <a:srgbClr val="000000">
+                <a:alpha val="32000"/>
+              </a:srgbClr>
+            </a:outerShdw>
+          </a:effectLst>
+          <a:scene3d>
+            <a:camera prst="orthographicFront">
+              <a:rot lat="0" lon="0" rev="0"/>
+            </a:camera>
+            <a:lightRig rig="balanced" dir="t">
+              <a:rot lat="0" lon="0" rev="8700000"/>
+            </a:lightRig>
+          </a:scene3d>
+          <a:sp3d>
+            <a:bevelT w="190500" h="38100"/>
+          </a:sp3d>
+        </p:spPr>
+        <p:style>
+          <a:lnRef idx="2">
+            <a:schemeClr val="accent1">
+              <a:shade val="50000"/>
+            </a:schemeClr>
+          </a:lnRef>
+          <a:fillRef idx="1">
+            <a:schemeClr val="accent1"/>
+          </a:fillRef>
+          <a:effectRef idx="0">
+            <a:schemeClr val="accent1"/>
+          </a:effectRef>
+          <a:fontRef idx="minor">
+            <a:schemeClr val="lt1"/>
+          </a:fontRef>
+        </p:style>
+        <p:txBody>
+          <a:bodyPr rtlCol="0" anchor="ctr"/>
+          <a:lstStyle/>
+          <a:p>
+            <a:pPr algn="ctr"/>
+            <a:endParaRPr lang="en-US" sz="2400" b="1" spc="50" dirty="0" smtClean="0">
+              <a:ln w="12700" cmpd="sng">
+                <a:solidFill>
+                  <a:schemeClr val="accent6">
+                    <a:satMod val="120000"/>
+                    <a:shade val="80000"/>
+                  </a:schemeClr>
+                </a:solidFill>
+                <a:prstDash val="solid"/>
+              </a:ln>
+              <a:solidFill>
+                <a:schemeClr val="accent6">
+                  <a:tint val="1000"/>
+                </a:schemeClr>
+              </a:solidFill>
+              <a:effectLst>
+                <a:glow rad="53100">
+                  <a:schemeClr val="accent6">
+                    <a:satMod val="180000"/>
+                    <a:alpha val="30000"/>
+                  </a:schemeClr>
+                </a:glow>
+              </a:effectLst>
+            </a:endParaRPr>
+          </a:p>
+        </p:txBody>
+      </p:sp>
+      <p:sp>
+        <p:nvSpPr>
+          <p:cNvPr id="9" name="Oval 8"/>
+          <p:cNvSpPr/>
+          <p:nvPr/>
+        </p:nvSpPr>
+        <p:spPr>
+          <a:xfrm>
+            <a:off x="990600" y="4876800"/>
+            <a:ext cx="914400" cy="914400"/>
+          </a:xfrm>
+          <a:prstGeom prst="ellipse">
+            <a:avLst/>
+          </a:prstGeom>
+          <a:ln>
+            <a:noFill/>
+          </a:ln>
+          <a:effectLst>
+            <a:outerShdw blurRad="44450" dist="27940" dir="5400000" algn="ctr">
+              <a:srgbClr val="000000">
+                <a:alpha val="32000"/>
+              </a:srgbClr>
+            </a:outerShdw>
+          </a:effectLst>
+          <a:scene3d>
+            <a:camera prst="orthographicFront">
+              <a:rot lat="0" lon="0" rev="0"/>
+            </a:camera>
+            <a:lightRig rig="balanced" dir="t">
+              <a:rot lat="0" lon="0" rev="8700000"/>
+            </a:lightRig>
+          </a:scene3d>
+          <a:sp3d>
+            <a:bevelT w="190500" h="38100"/>
+          </a:sp3d>
+        </p:spPr>
+        <p:style>
+          <a:lnRef idx="2">
+            <a:schemeClr val="accent1">
+              <a:shade val="50000"/>
+            </a:schemeClr>
+          </a:lnRef>
+          <a:fillRef idx="1">
+            <a:schemeClr val="accent1"/>
+          </a:fillRef>
+          <a:effectRef idx="0">
+            <a:schemeClr val="accent1"/>
+          </a:effectRef>
+          <a:fontRef idx="minor">
+            <a:schemeClr val="lt1"/>
+          </a:fontRef>
+        </p:style>
+        <p:txBody>
+          <a:bodyPr rtlCol="0" anchor="ctr"/>
+          <a:lstStyle/>
+          <a:p>
+            <a:pPr algn="ctr"/>
+            <a:endParaRPr lang="en-IN" sz="2400" b="1" spc="50" dirty="0">
+              <a:ln w="12700" cmpd="sng">
+                <a:solidFill>
+                  <a:schemeClr val="accent6">
+                    <a:satMod val="120000"/>
+                    <a:shade val="80000"/>
+                  </a:schemeClr>
+                </a:solidFill>
+                <a:prstDash val="solid"/>
+              </a:ln>
+              <a:solidFill>
+                <a:schemeClr val="accent6">
+                  <a:tint val="1000"/>
+                </a:schemeClr>
+              </a:solidFill>
+              <a:effectLst>
+                <a:glow rad="53100">
+                  <a:schemeClr val="accent6">
+                    <a:satMod val="180000"/>
+                    <a:alpha val="30000"/>
+                  </a:schemeClr>
+                </a:glow>
+              </a:effectLst>
+            </a:endParaRPr>
+          </a:p>
+        </p:txBody>
+      </p:sp>
+      <p:sp>
+        <p:nvSpPr>
+          <p:cNvPr id="10" name="Oval 9"/>
+          <p:cNvSpPr/>
+          <p:nvPr/>
+        </p:nvSpPr>
+        <p:spPr>
+          <a:xfrm>
+            <a:off x="4343400" y="2971800"/>
+            <a:ext cx="914400" cy="914400"/>
+          </a:xfrm>
+          <a:prstGeom prst="ellipse">
+            <a:avLst/>
+          </a:prstGeom>
+          <a:ln>
+            <a:noFill/>
+          </a:ln>
+          <a:effectLst>
+            <a:outerShdw blurRad="44450" dist="27940" dir="5400000" algn="ctr">
+              <a:srgbClr val="000000">
+                <a:alpha val="32000"/>
+              </a:srgbClr>
+            </a:outerShdw>
+          </a:effectLst>
+          <a:scene3d>
+            <a:camera prst="orthographicFront">
+              <a:rot lat="0" lon="0" rev="0"/>
+            </a:camera>
+            <a:lightRig rig="balanced" dir="t">
+              <a:rot lat="0" lon="0" rev="8700000"/>
+            </a:lightRig>
+          </a:scene3d>
+          <a:sp3d>
+            <a:bevelT w="190500" h="38100"/>
+          </a:sp3d>
+        </p:spPr>
+        <p:style>
+          <a:lnRef idx="2">
+            <a:schemeClr val="accent1">
+              <a:shade val="50000"/>
+            </a:schemeClr>
+          </a:lnRef>
+          <a:fillRef idx="1">
+            <a:schemeClr val="accent1"/>
+          </a:fillRef>
+          <a:effectRef idx="0">
+            <a:schemeClr val="accent1"/>
+          </a:effectRef>
+          <a:fontRef idx="minor">
+            <a:schemeClr val="lt1"/>
+          </a:fontRef>
+        </p:style>
+        <p:txBody>
+          <a:bodyPr rtlCol="0" anchor="ctr"/>
+          <a:lstStyle/>
+          <a:p>
+            <a:pPr algn="ctr"/>
+            <a:endParaRPr lang="en-US" sz="2400" b="1" spc="50" dirty="0" smtClean="0">
+              <a:ln w="12700" cmpd="sng">
+                <a:solidFill>
+                  <a:schemeClr val="accent6">
+                    <a:satMod val="120000"/>
+                    <a:shade val="80000"/>
+                  </a:schemeClr>
+                </a:solidFill>
+                <a:prstDash val="solid"/>
+              </a:ln>
+              <a:solidFill>
+                <a:schemeClr val="accent6">
+                  <a:tint val="1000"/>
+                </a:schemeClr>
+              </a:solidFill>
+              <a:effectLst>
+                <a:glow rad="53100">
+                  <a:schemeClr val="accent6">
+                    <a:satMod val="180000"/>
+                    <a:alpha val="30000"/>
+                  </a:schemeClr>
+                </a:glow>
+              </a:effectLst>
+            </a:endParaRPr>
+          </a:p>
+        </p:txBody>
+      </p:sp>
+      <p:sp>
+        <p:nvSpPr>
+          <p:cNvPr id="11" name="Oval 10"/>
+          <p:cNvSpPr/>
+          <p:nvPr/>
+        </p:nvSpPr>
+        <p:spPr>
+          <a:xfrm>
+            <a:off x="5943600" y="3962400"/>
+            <a:ext cx="914400" cy="914400"/>
+          </a:xfrm>
+          <a:prstGeom prst="ellipse">
+            <a:avLst/>
+          </a:prstGeom>
+          <a:ln>
+            <a:noFill/>
+          </a:ln>
+          <a:effectLst>
+            <a:outerShdw blurRad="44450" dist="27940" dir="5400000" algn="ctr">
+              <a:srgbClr val="000000">
+                <a:alpha val="32000"/>
+              </a:srgbClr>
+            </a:outerShdw>
+          </a:effectLst>
+          <a:scene3d>
+            <a:camera prst="orthographicFront">
+              <a:rot lat="0" lon="0" rev="0"/>
+            </a:camera>
+            <a:lightRig rig="balanced" dir="t">
+              <a:rot lat="0" lon="0" rev="8700000"/>
+            </a:lightRig>
+          </a:scene3d>
+          <a:sp3d>
+            <a:bevelT w="190500" h="38100"/>
+          </a:sp3d>
+        </p:spPr>
+        <p:style>
+          <a:lnRef idx="2">
+            <a:schemeClr val="accent1">
+              <a:shade val="50000"/>
+            </a:schemeClr>
+          </a:lnRef>
+          <a:fillRef idx="1">
+            <a:schemeClr val="accent1"/>
+          </a:fillRef>
+          <a:effectRef idx="0">
+            <a:schemeClr val="accent1"/>
+          </a:effectRef>
+          <a:fontRef idx="minor">
+            <a:schemeClr val="lt1"/>
+          </a:fontRef>
+        </p:style>
+        <p:txBody>
+          <a:bodyPr rtlCol="0" anchor="ctr"/>
+          <a:lstStyle/>
+          <a:p>
+            <a:pPr algn="ctr"/>
+            <a:endParaRPr lang="en-IN" sz="2400" b="1" spc="50" dirty="0">
+              <a:ln w="12700" cmpd="sng">
+                <a:solidFill>
+                  <a:schemeClr val="accent6">
+                    <a:satMod val="120000"/>
+                    <a:shade val="80000"/>
+                  </a:schemeClr>
+                </a:solidFill>
+                <a:prstDash val="solid"/>
+              </a:ln>
+              <a:solidFill>
+                <a:schemeClr val="accent6">
+                  <a:tint val="1000"/>
+                </a:schemeClr>
+              </a:solidFill>
+              <a:effectLst>
+                <a:glow rad="53100">
+                  <a:schemeClr val="accent6">
+                    <a:satMod val="180000"/>
+                    <a:alpha val="30000"/>
+                  </a:schemeClr>
+                </a:glow>
+              </a:effectLst>
+            </a:endParaRPr>
+          </a:p>
+        </p:txBody>
+      </p:sp>
+      <p:sp>
+        <p:nvSpPr>
+          <p:cNvPr id="12" name="Oval 11"/>
+          <p:cNvSpPr/>
+          <p:nvPr/>
+        </p:nvSpPr>
+        <p:spPr>
+          <a:xfrm>
+            <a:off x="5791200" y="2286000"/>
+            <a:ext cx="914400" cy="914400"/>
+          </a:xfrm>
+          <a:prstGeom prst="ellipse">
+            <a:avLst/>
+          </a:prstGeom>
+          <a:ln>
+            <a:noFill/>
+          </a:ln>
+          <a:effectLst>
+            <a:outerShdw blurRad="44450" dist="27940" dir="5400000" algn="ctr">
+              <a:srgbClr val="000000">
+                <a:alpha val="32000"/>
+              </a:srgbClr>
+            </a:outerShdw>
+          </a:effectLst>
+          <a:scene3d>
+            <a:camera prst="orthographicFront">
+              <a:rot lat="0" lon="0" rev="0"/>
+            </a:camera>
+            <a:lightRig rig="balanced" dir="t">
+              <a:rot lat="0" lon="0" rev="8700000"/>
+            </a:lightRig>
+          </a:scene3d>
+          <a:sp3d>
+            <a:bevelT w="190500" h="38100"/>
+          </a:sp3d>
+        </p:spPr>
+        <p:style>
+          <a:lnRef idx="2">
+            <a:schemeClr val="accent1">
+              <a:shade val="50000"/>
+            </a:schemeClr>
+          </a:lnRef>
+          <a:fillRef idx="1">
+            <a:schemeClr val="accent1"/>
+          </a:fillRef>
+          <a:effectRef idx="0">
+            <a:schemeClr val="accent1"/>
+          </a:effectRef>
+          <a:fontRef idx="minor">
+            <a:schemeClr val="lt1"/>
+          </a:fontRef>
+        </p:style>
+        <p:txBody>
+          <a:bodyPr rtlCol="0" anchor="ctr"/>
+          <a:lstStyle/>
+          <a:p>
+            <a:pPr algn="ctr"/>
+            <a:endParaRPr lang="en-IN" sz="2400" b="1" spc="50" dirty="0">
+              <a:ln w="12700" cmpd="sng">
+                <a:solidFill>
+                  <a:schemeClr val="accent6">
+                    <a:satMod val="120000"/>
+                    <a:shade val="80000"/>
+                  </a:schemeClr>
+                </a:solidFill>
+                <a:prstDash val="solid"/>
+              </a:ln>
+              <a:solidFill>
+                <a:schemeClr val="accent6">
+                  <a:tint val="1000"/>
+                </a:schemeClr>
+              </a:solidFill>
+              <a:effectLst>
+                <a:glow rad="53100">
+                  <a:schemeClr val="accent6">
+                    <a:satMod val="180000"/>
+                    <a:alpha val="30000"/>
+                  </a:schemeClr>
+                </a:glow>
+              </a:effectLst>
+            </a:endParaRPr>
+          </a:p>
+        </p:txBody>
+      </p:sp>
+      <p:cxnSp>
+        <p:nvCxnSpPr>
+          <p:cNvPr id="13" name="Straight Connector 12"/>
+          <p:cNvCxnSpPr>
+            <a:stCxn id="9" idx="0"/>
+          </p:cNvCxnSpPr>
+          <p:nvPr/>
+        </p:nvCxnSpPr>
+        <p:spPr>
+          <a:xfrm flipV="1">
+            <a:off x="1447800" y="3200400"/>
+            <a:ext cx="609600" cy="1676400"/>
+          </a:xfrm>
+          <a:prstGeom prst="line">
+            <a:avLst/>
+          </a:prstGeom>
+        </p:spPr>
+        <p:style>
+          <a:lnRef idx="1">
+            <a:schemeClr val="accent1"/>
+          </a:lnRef>
+          <a:fillRef idx="0">
+            <a:schemeClr val="accent1"/>
+          </a:fillRef>
+          <a:effectRef idx="0">
+            <a:schemeClr val="accent1"/>
+          </a:effectRef>
+          <a:fontRef idx="minor">
+            <a:schemeClr val="tx1"/>
+          </a:fontRef>
+        </p:style>
+      </p:cxnSp>
+      <p:cxnSp>
+        <p:nvCxnSpPr>
+          <p:cNvPr id="14" name="Straight Connector 13"/>
+          <p:cNvCxnSpPr>
+            <a:stCxn id="9" idx="7"/>
+            <a:endCxn id="8" idx="3"/>
+          </p:cNvCxnSpPr>
+          <p:nvPr/>
+        </p:nvCxnSpPr>
+        <p:spPr>
+          <a:xfrm flipV="1">
+            <a:off x="1771089" y="4666689"/>
+            <a:ext cx="877422" cy="344022"/>
+          </a:xfrm>
+          <a:prstGeom prst="line">
+            <a:avLst/>
+          </a:prstGeom>
+        </p:spPr>
+        <p:style>
+          <a:lnRef idx="1">
+            <a:schemeClr val="accent1"/>
+          </a:lnRef>
+          <a:fillRef idx="0">
+            <a:schemeClr val="accent1"/>
+          </a:fillRef>
+          <a:effectRef idx="0">
+            <a:schemeClr val="accent1"/>
+          </a:effectRef>
+          <a:fontRef idx="minor">
+            <a:schemeClr val="tx1"/>
+          </a:fontRef>
+        </p:style>
+      </p:cxnSp>
+      <p:cxnSp>
+        <p:nvCxnSpPr>
+          <p:cNvPr id="15" name="Straight Connector 14"/>
+          <p:cNvCxnSpPr>
+            <a:endCxn id="4" idx="2"/>
+          </p:cNvCxnSpPr>
+          <p:nvPr/>
+        </p:nvCxnSpPr>
+        <p:spPr>
+          <a:xfrm flipV="1">
+            <a:off x="2590800" y="2286000"/>
+            <a:ext cx="685800" cy="381000"/>
+          </a:xfrm>
+          <a:prstGeom prst="line">
+            <a:avLst/>
+          </a:prstGeom>
+        </p:spPr>
+        <p:style>
+          <a:lnRef idx="1">
+            <a:schemeClr val="accent1"/>
+          </a:lnRef>
+          <a:fillRef idx="0">
+            <a:schemeClr val="accent1"/>
+          </a:fillRef>
+          <a:effectRef idx="0">
+            <a:schemeClr val="accent1"/>
+          </a:effectRef>
+          <a:fontRef idx="minor">
+            <a:schemeClr val="tx1"/>
+          </a:fontRef>
+        </p:style>
+      </p:cxnSp>
+      <p:cxnSp>
+        <p:nvCxnSpPr>
+          <p:cNvPr id="16" name="Straight Connector 15"/>
+          <p:cNvCxnSpPr>
+            <a:endCxn id="10" idx="3"/>
+          </p:cNvCxnSpPr>
+          <p:nvPr/>
+        </p:nvCxnSpPr>
+        <p:spPr>
+          <a:xfrm flipV="1">
+            <a:off x="3429000" y="3752289"/>
+            <a:ext cx="1048311" cy="591111"/>
+          </a:xfrm>
+          <a:prstGeom prst="line">
+            <a:avLst/>
+          </a:prstGeom>
+        </p:spPr>
+        <p:style>
+          <a:lnRef idx="1">
+            <a:schemeClr val="accent1"/>
+          </a:lnRef>
+          <a:fillRef idx="0">
+            <a:schemeClr val="accent1"/>
+          </a:fillRef>
+          <a:effectRef idx="0">
+            <a:schemeClr val="accent1"/>
+          </a:effectRef>
+          <a:fontRef idx="minor">
+            <a:schemeClr val="tx1"/>
+          </a:fontRef>
+        </p:style>
+      </p:cxnSp>
+      <p:cxnSp>
+        <p:nvCxnSpPr>
+          <p:cNvPr id="17" name="Straight Connector 16"/>
+          <p:cNvCxnSpPr>
+            <a:stCxn id="5" idx="0"/>
+            <a:endCxn id="11" idx="3"/>
+          </p:cNvCxnSpPr>
+          <p:nvPr/>
+        </p:nvCxnSpPr>
+        <p:spPr>
+          <a:xfrm flipV="1">
+            <a:off x="5486400" y="4742889"/>
+            <a:ext cx="591111" cy="895911"/>
+          </a:xfrm>
+          <a:prstGeom prst="line">
+            <a:avLst/>
+          </a:prstGeom>
+        </p:spPr>
+        <p:style>
+          <a:lnRef idx="1">
+            <a:schemeClr val="accent1"/>
+          </a:lnRef>
+          <a:fillRef idx="0">
+            <a:schemeClr val="accent1"/>
+          </a:fillRef>
+          <a:effectRef idx="0">
+            <a:schemeClr val="accent1"/>
+          </a:effectRef>
+          <a:fontRef idx="minor">
+            <a:schemeClr val="tx1"/>
+          </a:fontRef>
+        </p:style>
+      </p:cxnSp>
+      <p:cxnSp>
+        <p:nvCxnSpPr>
+          <p:cNvPr id="18" name="Straight Connector 17"/>
+          <p:cNvCxnSpPr>
+            <a:stCxn id="5" idx="6"/>
+            <a:endCxn id="6" idx="2"/>
+          </p:cNvCxnSpPr>
+          <p:nvPr/>
+        </p:nvCxnSpPr>
+        <p:spPr>
+          <a:xfrm flipV="1">
+            <a:off x="5943600" y="6019800"/>
+            <a:ext cx="1676400" cy="76200"/>
+          </a:xfrm>
+          <a:prstGeom prst="line">
+            <a:avLst/>
+          </a:prstGeom>
+        </p:spPr>
+        <p:style>
+          <a:lnRef idx="1">
+            <a:schemeClr val="accent1"/>
+          </a:lnRef>
+          <a:fillRef idx="0">
+            <a:schemeClr val="accent1"/>
+          </a:fillRef>
+          <a:effectRef idx="0">
+            <a:schemeClr val="accent1"/>
+          </a:effectRef>
+          <a:fontRef idx="minor">
+            <a:schemeClr val="tx1"/>
+          </a:fontRef>
+        </p:style>
+      </p:cxnSp>
+      <p:cxnSp>
+        <p:nvCxnSpPr>
+          <p:cNvPr id="19" name="Straight Connector 18"/>
+          <p:cNvCxnSpPr>
+            <a:stCxn id="4" idx="5"/>
+            <a:endCxn id="10" idx="1"/>
+          </p:cNvCxnSpPr>
+          <p:nvPr/>
+        </p:nvCxnSpPr>
+        <p:spPr>
+          <a:xfrm>
+            <a:off x="4057089" y="2609289"/>
+            <a:ext cx="420222" cy="496422"/>
+          </a:xfrm>
+          <a:prstGeom prst="line">
+            <a:avLst/>
+          </a:prstGeom>
+        </p:spPr>
+        <p:style>
+          <a:lnRef idx="1">
+            <a:schemeClr val="accent1"/>
+          </a:lnRef>
+          <a:fillRef idx="0">
+            <a:schemeClr val="accent1"/>
+          </a:fillRef>
+          <a:effectRef idx="0">
+            <a:schemeClr val="accent1"/>
+          </a:effectRef>
+          <a:fontRef idx="minor">
+            <a:schemeClr val="tx1"/>
+          </a:fontRef>
+        </p:style>
+      </p:cxnSp>
+      <p:cxnSp>
+        <p:nvCxnSpPr>
+          <p:cNvPr id="20" name="Straight Connector 19"/>
+          <p:cNvCxnSpPr>
+            <a:stCxn id="10" idx="7"/>
+            <a:endCxn id="12" idx="2"/>
+          </p:cNvCxnSpPr>
+          <p:nvPr/>
+        </p:nvCxnSpPr>
+        <p:spPr>
+          <a:xfrm flipV="1">
+            <a:off x="5123889" y="2743200"/>
+            <a:ext cx="667311" cy="362511"/>
+          </a:xfrm>
+          <a:prstGeom prst="line">
+            <a:avLst/>
+          </a:prstGeom>
+        </p:spPr>
+        <p:style>
+          <a:lnRef idx="1">
+            <a:schemeClr val="accent1"/>
+          </a:lnRef>
+          <a:fillRef idx="0">
+            <a:schemeClr val="accent1"/>
+          </a:fillRef>
+          <a:effectRef idx="0">
+            <a:schemeClr val="accent1"/>
+          </a:effectRef>
+          <a:fontRef idx="minor">
+            <a:schemeClr val="tx1"/>
+          </a:fontRef>
+        </p:style>
+      </p:cxnSp>
+      <p:cxnSp>
+        <p:nvCxnSpPr>
+          <p:cNvPr id="21" name="Straight Connector 20"/>
+          <p:cNvCxnSpPr>
+            <a:stCxn id="10" idx="5"/>
+            <a:endCxn id="11" idx="1"/>
+          </p:cNvCxnSpPr>
+          <p:nvPr/>
+        </p:nvCxnSpPr>
+        <p:spPr>
+          <a:xfrm>
+            <a:off x="5123889" y="3752289"/>
+            <a:ext cx="953622" cy="344022"/>
+          </a:xfrm>
+          <a:prstGeom prst="line">
+            <a:avLst/>
+          </a:prstGeom>
+        </p:spPr>
+        <p:style>
+          <a:lnRef idx="1">
+            <a:schemeClr val="accent1"/>
+          </a:lnRef>
+          <a:fillRef idx="0">
+            <a:schemeClr val="accent1"/>
+          </a:fillRef>
+          <a:effectRef idx="0">
+            <a:schemeClr val="accent1"/>
+          </a:effectRef>
+          <a:fontRef idx="minor">
+            <a:schemeClr val="tx1"/>
+          </a:fontRef>
+        </p:style>
+      </p:cxnSp>
+      <p:sp>
+        <p:nvSpPr>
+          <p:cNvPr id="22" name="TextBox 21"/>
+          <p:cNvSpPr txBox="1"/>
+          <p:nvPr/>
+        </p:nvSpPr>
+        <p:spPr>
+          <a:xfrm>
+            <a:off x="1295400" y="5181600"/>
+            <a:ext cx="312906" cy="369332"/>
+          </a:xfrm>
+          <a:prstGeom prst="rect">
+            <a:avLst/>
+          </a:prstGeom>
+          <a:noFill/>
+        </p:spPr>
+        <p:txBody>
+          <a:bodyPr wrap="none" rtlCol="0">
+            <a:spAutoFit/>
+          </a:bodyPr>
+          <a:lstStyle/>
+          <a:p>
+            <a:r>
+              <a:rPr lang="en-US" dirty="0" smtClean="0"/>
+              <a:t>1</a:t>
+            </a:r>
+            <a:endParaRPr lang="en-IN" dirty="0"/>
+          </a:p>
+        </p:txBody>
+      </p:sp>
+      <p:sp>
+        <p:nvSpPr>
+          <p:cNvPr id="23" name="TextBox 22"/>
+          <p:cNvSpPr txBox="1"/>
+          <p:nvPr/>
+        </p:nvSpPr>
+        <p:spPr>
+          <a:xfrm>
+            <a:off x="1981200" y="2590800"/>
+            <a:ext cx="312906" cy="369332"/>
+          </a:xfrm>
+          <a:prstGeom prst="rect">
+            <a:avLst/>
+          </a:prstGeom>
+          <a:noFill/>
+        </p:spPr>
+        <p:txBody>
+          <a:bodyPr wrap="none" rtlCol="0">
+            <a:spAutoFit/>
+          </a:bodyPr>
+          <a:lstStyle/>
+          <a:p>
+            <a:r>
+              <a:rPr lang="en-US" dirty="0" smtClean="0"/>
+              <a:t>2</a:t>
+            </a:r>
+            <a:endParaRPr lang="en-IN" dirty="0"/>
+          </a:p>
+        </p:txBody>
+      </p:sp>
+      <p:sp>
+        <p:nvSpPr>
+          <p:cNvPr id="24" name="TextBox 23"/>
+          <p:cNvSpPr txBox="1"/>
+          <p:nvPr/>
+        </p:nvSpPr>
+        <p:spPr>
+          <a:xfrm>
+            <a:off x="3581400" y="2133600"/>
+            <a:ext cx="312906" cy="369332"/>
+          </a:xfrm>
+          <a:prstGeom prst="rect">
+            <a:avLst/>
+          </a:prstGeom>
+          <a:noFill/>
+        </p:spPr>
+        <p:txBody>
+          <a:bodyPr wrap="none" rtlCol="0">
+            <a:spAutoFit/>
+          </a:bodyPr>
+          <a:lstStyle/>
+          <a:p>
+            <a:r>
+              <a:rPr lang="en-US" dirty="0" smtClean="0"/>
+              <a:t>3</a:t>
+            </a:r>
+            <a:endParaRPr lang="en-IN" dirty="0"/>
+          </a:p>
+        </p:txBody>
+      </p:sp>
+      <p:sp>
+        <p:nvSpPr>
+          <p:cNvPr id="25" name="TextBox 24"/>
+          <p:cNvSpPr txBox="1"/>
+          <p:nvPr/>
+        </p:nvSpPr>
+        <p:spPr>
+          <a:xfrm>
+            <a:off x="4648200" y="3276600"/>
+            <a:ext cx="312906" cy="369332"/>
+          </a:xfrm>
+          <a:prstGeom prst="rect">
+            <a:avLst/>
+          </a:prstGeom>
+          <a:noFill/>
+        </p:spPr>
+        <p:txBody>
+          <a:bodyPr wrap="none" rtlCol="0">
+            <a:spAutoFit/>
+          </a:bodyPr>
+          <a:lstStyle/>
+          <a:p>
+            <a:r>
+              <a:rPr lang="en-US" dirty="0" smtClean="0"/>
+              <a:t>4</a:t>
+            </a:r>
+            <a:endParaRPr lang="en-IN" dirty="0"/>
+          </a:p>
+        </p:txBody>
+      </p:sp>
+      <p:sp>
+        <p:nvSpPr>
+          <p:cNvPr id="26" name="TextBox 25"/>
+          <p:cNvSpPr txBox="1"/>
+          <p:nvPr/>
+        </p:nvSpPr>
+        <p:spPr>
+          <a:xfrm>
+            <a:off x="2819400" y="4191000"/>
+            <a:ext cx="312906" cy="369332"/>
+          </a:xfrm>
+          <a:prstGeom prst="rect">
+            <a:avLst/>
+          </a:prstGeom>
+          <a:noFill/>
+        </p:spPr>
+        <p:txBody>
+          <a:bodyPr wrap="none" rtlCol="0">
+            <a:spAutoFit/>
+          </a:bodyPr>
+          <a:lstStyle/>
+          <a:p>
+            <a:r>
+              <a:rPr lang="en-US" dirty="0" smtClean="0"/>
+              <a:t>5</a:t>
+            </a:r>
+            <a:endParaRPr lang="en-IN" dirty="0"/>
+          </a:p>
+        </p:txBody>
+      </p:sp>
+      <p:sp>
+        <p:nvSpPr>
+          <p:cNvPr id="27" name="TextBox 26"/>
+          <p:cNvSpPr txBox="1"/>
+          <p:nvPr/>
+        </p:nvSpPr>
+        <p:spPr>
+          <a:xfrm>
+            <a:off x="6248400" y="4267200"/>
+            <a:ext cx="312906" cy="369332"/>
+          </a:xfrm>
+          <a:prstGeom prst="rect">
+            <a:avLst/>
+          </a:prstGeom>
+          <a:noFill/>
+        </p:spPr>
+        <p:txBody>
+          <a:bodyPr wrap="none" rtlCol="0">
+            <a:spAutoFit/>
+          </a:bodyPr>
+          <a:lstStyle/>
+          <a:p>
+            <a:r>
+              <a:rPr lang="en-US" dirty="0" smtClean="0"/>
+              <a:t>6</a:t>
+            </a:r>
+            <a:endParaRPr lang="en-IN" dirty="0"/>
+          </a:p>
+        </p:txBody>
+      </p:sp>
+      <p:sp>
+        <p:nvSpPr>
+          <p:cNvPr id="28" name="TextBox 27"/>
+          <p:cNvSpPr txBox="1"/>
+          <p:nvPr/>
+        </p:nvSpPr>
+        <p:spPr>
+          <a:xfrm>
+            <a:off x="5334000" y="5943600"/>
+            <a:ext cx="312906" cy="369332"/>
+          </a:xfrm>
+          <a:prstGeom prst="rect">
+            <a:avLst/>
+          </a:prstGeom>
+          <a:noFill/>
+        </p:spPr>
+        <p:txBody>
+          <a:bodyPr wrap="none" rtlCol="0">
+            <a:spAutoFit/>
+          </a:bodyPr>
+          <a:lstStyle/>
+          <a:p>
+            <a:r>
+              <a:rPr lang="en-US" dirty="0" smtClean="0"/>
+              <a:t>7</a:t>
+            </a:r>
+            <a:endParaRPr lang="en-IN" dirty="0"/>
+          </a:p>
+        </p:txBody>
+      </p:sp>
+      <p:sp>
+        <p:nvSpPr>
+          <p:cNvPr id="32" name="TextBox 31"/>
+          <p:cNvSpPr txBox="1"/>
+          <p:nvPr/>
+        </p:nvSpPr>
+        <p:spPr>
+          <a:xfrm>
+            <a:off x="7924800" y="5791200"/>
+            <a:ext cx="312906" cy="369332"/>
+          </a:xfrm>
+          <a:prstGeom prst="rect">
+            <a:avLst/>
+          </a:prstGeom>
+          <a:noFill/>
+        </p:spPr>
+        <p:txBody>
+          <a:bodyPr wrap="none" rtlCol="0">
+            <a:spAutoFit/>
+          </a:bodyPr>
+          <a:lstStyle/>
+          <a:p>
+            <a:r>
+              <a:rPr lang="en-US" dirty="0" smtClean="0"/>
+              <a:t>8</a:t>
+            </a:r>
+            <a:endParaRPr lang="en-IN" dirty="0"/>
+          </a:p>
+        </p:txBody>
+      </p:sp>
+      <p:sp>
+        <p:nvSpPr>
+          <p:cNvPr id="33" name="TextBox 32"/>
+          <p:cNvSpPr txBox="1"/>
+          <p:nvPr/>
+        </p:nvSpPr>
+        <p:spPr>
+          <a:xfrm>
+            <a:off x="6096000" y="2590800"/>
+            <a:ext cx="312906" cy="369332"/>
+          </a:xfrm>
+          <a:prstGeom prst="rect">
+            <a:avLst/>
+          </a:prstGeom>
+          <a:noFill/>
+        </p:spPr>
+        <p:txBody>
+          <a:bodyPr wrap="none" rtlCol="0">
+            <a:spAutoFit/>
+          </a:bodyPr>
+          <a:lstStyle/>
+          <a:p>
+            <a:r>
+              <a:rPr lang="en-US" dirty="0" smtClean="0"/>
+              <a:t>9</a:t>
+            </a:r>
+            <a:endParaRPr lang="en-IN" dirty="0"/>
+          </a:p>
+        </p:txBody>
+      </p:sp>
+    </p:spTree>
+  </p:cSld>
+  <p:clrMapOvr>
+    <a:masterClrMapping/>
+  </p:clrMapOvr>
+  <p:timing>
+    <p:tnLst>
+      <p:par>
+        <p:cTn id="1" dur="indefinite" restart="never" nodeType="tmRoot">
+          <p:childTnLst>
+            <p:seq concurrent="1" nextAc="seek">
+              <p:cTn id="2" dur="indefinite" nodeType="mainSeq">
+                <p:childTnLst>
+                  <p:par>
+                    <p:cTn id="3" fill="hold">
+                      <p:stCondLst>
+                        <p:cond delay="indefinite"/>
+                      </p:stCondLst>
+                      <p:childTnLst>
+                        <p:par>
+                          <p:cTn id="4" fill="hold">
+                            <p:stCondLst>
+                              <p:cond delay="0"/>
+                            </p:stCondLst>
+                            <p:childTnLst>
+                              <p:par>
+                                <p:cTn id="5" presetID="21" presetClass="emph" presetSubtype="0" fill="hold" grpId="0" nodeType="clickEffect">
+                                  <p:stCondLst>
+                                    <p:cond delay="0"/>
+                                  </p:stCondLst>
+                                  <p:childTnLst>
+                                    <p:animClr clrSpc="hsl">
+                                      <p:cBhvr override="childStyle">
+                                        <p:cTn id="6" dur="500" fill="hold"/>
+                                        <p:tgtEl>
+                                          <p:spTgt spid="9"/>
+                                        </p:tgtEl>
+                                        <p:attrNameLst>
+                                          <p:attrName>style.color</p:attrName>
+                                        </p:attrNameLst>
+                                      </p:cBhvr>
+                                      <p:by>
+                                        <p:hsl h="7200000" s="0" l="0"/>
+                                      </p:by>
+                                    </p:animClr>
+                                    <p:animClr clrSpc="hsl">
+                                      <p:cBhvr>
+                                        <p:cTn id="7" dur="500" fill="hold"/>
+                                        <p:tgtEl>
+                                          <p:spTgt spid="9"/>
+                                        </p:tgtEl>
+                                        <p:attrNameLst>
+                                          <p:attrName>fillcolor</p:attrName>
+                                        </p:attrNameLst>
+                                      </p:cBhvr>
+                                      <p:by>
+                                        <p:hsl h="7200000" s="0" l="0"/>
+                                      </p:by>
+                                    </p:animClr>
+                                    <p:animClr clrSpc="hsl">
+                                      <p:cBhvr>
+                                        <p:cTn id="8" dur="500" fill="hold"/>
+                                        <p:tgtEl>
+                                          <p:spTgt spid="9"/>
+                                        </p:tgtEl>
+                                        <p:attrNameLst>
+                                          <p:attrName>stroke.color</p:attrName>
+                                        </p:attrNameLst>
+                                      </p:cBhvr>
+                                      <p:by>
+                                        <p:hsl h="7200000" s="0" l="0"/>
+                                      </p:by>
+                                    </p:animClr>
+                                    <p:set>
+                                      <p:cBhvr>
+                                        <p:cTn id="9" dur="500" fill="hold"/>
+                                        <p:tgtEl>
+                                          <p:spTgt spid="9"/>
+                                        </p:tgtEl>
+                                        <p:attrNameLst>
+                                          <p:attrName>fill.type</p:attrName>
+                                        </p:attrNameLst>
+                                      </p:cBhvr>
+                                      <p:to>
+                                        <p:strVal val="solid"/>
+                                      </p:to>
+                                    </p:set>
+                                  </p:childTnLst>
+                                </p:cTn>
+                              </p:par>
+                              <p:par>
+                                <p:cTn id="10" presetID="1" presetClass="entr" presetSubtype="0" fill="hold" grpId="0" nodeType="withEffect">
+                                  <p:stCondLst>
+                                    <p:cond delay="0"/>
+                                  </p:stCondLst>
+                                  <p:childTnLst>
+                                    <p:set>
+                                      <p:cBhvr>
+                                        <p:cTn id="11" dur="1" fill="hold">
+                                          <p:stCondLst>
+                                            <p:cond delay="0"/>
+                                          </p:stCondLst>
+                                        </p:cTn>
+                                        <p:tgtEl>
+                                          <p:spTgt spid="22"/>
+                                        </p:tgtEl>
+                                        <p:attrNameLst>
+                                          <p:attrName>style.visibility</p:attrName>
+                                        </p:attrNameLst>
+                                      </p:cBhvr>
+                                      <p:to>
+                                        <p:strVal val="visible"/>
+                                      </p:to>
+                                    </p:set>
+                                  </p:childTnLst>
+                                </p:cTn>
+                              </p:par>
+                            </p:childTnLst>
+                          </p:cTn>
+                        </p:par>
+                      </p:childTnLst>
+                    </p:cTn>
+                  </p:par>
+                  <p:par>
+                    <p:cTn id="12" fill="hold">
+                      <p:stCondLst>
+                        <p:cond delay="indefinite"/>
+                      </p:stCondLst>
+                      <p:childTnLst>
+                        <p:par>
+                          <p:cTn id="13" fill="hold">
+                            <p:stCondLst>
+                              <p:cond delay="0"/>
+                            </p:stCondLst>
+                            <p:childTnLst>
+                              <p:par>
+                                <p:cTn id="14" presetID="21" presetClass="emph" presetSubtype="0" fill="hold" grpId="0" nodeType="clickEffect">
+                                  <p:stCondLst>
+                                    <p:cond delay="0"/>
+                                  </p:stCondLst>
+                                  <p:childTnLst>
+                                    <p:animClr clrSpc="hsl">
+                                      <p:cBhvr override="childStyle">
+                                        <p:cTn id="15" dur="500" fill="hold"/>
+                                        <p:tgtEl>
+                                          <p:spTgt spid="7"/>
+                                        </p:tgtEl>
+                                        <p:attrNameLst>
+                                          <p:attrName>style.color</p:attrName>
+                                        </p:attrNameLst>
+                                      </p:cBhvr>
+                                      <p:by>
+                                        <p:hsl h="7200000" s="0" l="0"/>
+                                      </p:by>
+                                    </p:animClr>
+                                    <p:animClr clrSpc="hsl">
+                                      <p:cBhvr>
+                                        <p:cTn id="16" dur="500" fill="hold"/>
+                                        <p:tgtEl>
+                                          <p:spTgt spid="7"/>
+                                        </p:tgtEl>
+                                        <p:attrNameLst>
+                                          <p:attrName>fillcolor</p:attrName>
+                                        </p:attrNameLst>
+                                      </p:cBhvr>
+                                      <p:by>
+                                        <p:hsl h="7200000" s="0" l="0"/>
+                                      </p:by>
+                                    </p:animClr>
+                                    <p:animClr clrSpc="hsl">
+                                      <p:cBhvr>
+                                        <p:cTn id="17" dur="500" fill="hold"/>
+                                        <p:tgtEl>
+                                          <p:spTgt spid="7"/>
+                                        </p:tgtEl>
+                                        <p:attrNameLst>
+                                          <p:attrName>stroke.color</p:attrName>
+                                        </p:attrNameLst>
+                                      </p:cBhvr>
+                                      <p:by>
+                                        <p:hsl h="7200000" s="0" l="0"/>
+                                      </p:by>
+                                    </p:animClr>
+                                    <p:set>
+                                      <p:cBhvr>
+                                        <p:cTn id="18" dur="500" fill="hold"/>
+                                        <p:tgtEl>
+                                          <p:spTgt spid="7"/>
+                                        </p:tgtEl>
+                                        <p:attrNameLst>
+                                          <p:attrName>fill.type</p:attrName>
+                                        </p:attrNameLst>
+                                      </p:cBhvr>
+                                      <p:to>
+                                        <p:strVal val="solid"/>
+                                      </p:to>
+                                    </p:set>
+                                  </p:childTnLst>
+                                </p:cTn>
+                              </p:par>
+                              <p:par>
+                                <p:cTn id="19" presetID="1" presetClass="entr" presetSubtype="0" fill="hold" grpId="0" nodeType="withEffect">
+                                  <p:stCondLst>
+                                    <p:cond delay="0"/>
+                                  </p:stCondLst>
+                                  <p:childTnLst>
+                                    <p:set>
+                                      <p:cBhvr>
+                                        <p:cTn id="20" dur="1" fill="hold">
+                                          <p:stCondLst>
+                                            <p:cond delay="0"/>
+                                          </p:stCondLst>
+                                        </p:cTn>
+                                        <p:tgtEl>
+                                          <p:spTgt spid="23"/>
+                                        </p:tgtEl>
+                                        <p:attrNameLst>
+                                          <p:attrName>style.visibility</p:attrName>
+                                        </p:attrNameLst>
+                                      </p:cBhvr>
+                                      <p:to>
+                                        <p:strVal val="visible"/>
+                                      </p:to>
+                                    </p:set>
+                                  </p:childTnLst>
+                                </p:cTn>
+                              </p:par>
+                            </p:childTnLst>
+                          </p:cTn>
+                        </p:par>
+                      </p:childTnLst>
+                    </p:cTn>
+                  </p:par>
+                  <p:par>
+                    <p:cTn id="21" fill="hold">
+                      <p:stCondLst>
+                        <p:cond delay="indefinite"/>
+                      </p:stCondLst>
+                      <p:childTnLst>
+                        <p:par>
+                          <p:cTn id="22" fill="hold">
+                            <p:stCondLst>
+                              <p:cond delay="0"/>
+                            </p:stCondLst>
+                            <p:childTnLst>
+                              <p:par>
+                                <p:cTn id="23" presetID="21" presetClass="emph" presetSubtype="0" fill="hold" grpId="0" nodeType="clickEffect">
+                                  <p:stCondLst>
+                                    <p:cond delay="0"/>
+                                  </p:stCondLst>
+                                  <p:childTnLst>
+                                    <p:animClr clrSpc="hsl">
+                                      <p:cBhvr override="childStyle">
+                                        <p:cTn id="24" dur="500" fill="hold"/>
+                                        <p:tgtEl>
+                                          <p:spTgt spid="4"/>
+                                        </p:tgtEl>
+                                        <p:attrNameLst>
+                                          <p:attrName>style.color</p:attrName>
+                                        </p:attrNameLst>
+                                      </p:cBhvr>
+                                      <p:by>
+                                        <p:hsl h="7200000" s="0" l="0"/>
+                                      </p:by>
+                                    </p:animClr>
+                                    <p:animClr clrSpc="hsl">
+                                      <p:cBhvr>
+                                        <p:cTn id="25" dur="500" fill="hold"/>
+                                        <p:tgtEl>
+                                          <p:spTgt spid="4"/>
+                                        </p:tgtEl>
+                                        <p:attrNameLst>
+                                          <p:attrName>fillcolor</p:attrName>
+                                        </p:attrNameLst>
+                                      </p:cBhvr>
+                                      <p:by>
+                                        <p:hsl h="7200000" s="0" l="0"/>
+                                      </p:by>
+                                    </p:animClr>
+                                    <p:animClr clrSpc="hsl">
+                                      <p:cBhvr>
+                                        <p:cTn id="26" dur="500" fill="hold"/>
+                                        <p:tgtEl>
+                                          <p:spTgt spid="4"/>
+                                        </p:tgtEl>
+                                        <p:attrNameLst>
+                                          <p:attrName>stroke.color</p:attrName>
+                                        </p:attrNameLst>
+                                      </p:cBhvr>
+                                      <p:by>
+                                        <p:hsl h="7200000" s="0" l="0"/>
+                                      </p:by>
+                                    </p:animClr>
+                                    <p:set>
+                                      <p:cBhvr>
+                                        <p:cTn id="27" dur="500" fill="hold"/>
+                                        <p:tgtEl>
+                                          <p:spTgt spid="4"/>
+                                        </p:tgtEl>
+                                        <p:attrNameLst>
+                                          <p:attrName>fill.type</p:attrName>
+                                        </p:attrNameLst>
+                                      </p:cBhvr>
+                                      <p:to>
+                                        <p:strVal val="solid"/>
+                                      </p:to>
+                                    </p:set>
+                                  </p:childTnLst>
+                                </p:cTn>
+                              </p:par>
+                              <p:par>
+                                <p:cTn id="28" presetID="1" presetClass="entr" presetSubtype="0" fill="hold" grpId="0" nodeType="withEffect">
+                                  <p:stCondLst>
+                                    <p:cond delay="0"/>
+                                  </p:stCondLst>
+                                  <p:childTnLst>
+                                    <p:set>
+                                      <p:cBhvr>
+                                        <p:cTn id="29" dur="1" fill="hold">
+                                          <p:stCondLst>
+                                            <p:cond delay="0"/>
+                                          </p:stCondLst>
+                                        </p:cTn>
+                                        <p:tgtEl>
+                                          <p:spTgt spid="24"/>
+                                        </p:tgtEl>
+                                        <p:attrNameLst>
+                                          <p:attrName>style.visibility</p:attrName>
+                                        </p:attrNameLst>
+                                      </p:cBhvr>
+                                      <p:to>
+                                        <p:strVal val="visible"/>
+                                      </p:to>
+                                    </p:set>
+                                  </p:childTnLst>
+                                </p:cTn>
+                              </p:par>
+                            </p:childTnLst>
+                          </p:cTn>
+                        </p:par>
+                      </p:childTnLst>
+                    </p:cTn>
+                  </p:par>
+                  <p:par>
+                    <p:cTn id="30" fill="hold">
+                      <p:stCondLst>
+                        <p:cond delay="indefinite"/>
+                      </p:stCondLst>
+                      <p:childTnLst>
+                        <p:par>
+                          <p:cTn id="31" fill="hold">
+                            <p:stCondLst>
+                              <p:cond delay="0"/>
+                            </p:stCondLst>
+                            <p:childTnLst>
+                              <p:par>
+                                <p:cTn id="32" presetID="21" presetClass="emph" presetSubtype="0" fill="hold" grpId="0" nodeType="clickEffect">
+                                  <p:stCondLst>
+                                    <p:cond delay="0"/>
+                                  </p:stCondLst>
+                                  <p:childTnLst>
+                                    <p:animClr clrSpc="hsl">
+                                      <p:cBhvr override="childStyle">
+                                        <p:cTn id="33" dur="500" fill="hold"/>
+                                        <p:tgtEl>
+                                          <p:spTgt spid="10"/>
+                                        </p:tgtEl>
+                                        <p:attrNameLst>
+                                          <p:attrName>style.color</p:attrName>
+                                        </p:attrNameLst>
+                                      </p:cBhvr>
+                                      <p:by>
+                                        <p:hsl h="7200000" s="0" l="0"/>
+                                      </p:by>
+                                    </p:animClr>
+                                    <p:animClr clrSpc="hsl">
+                                      <p:cBhvr>
+                                        <p:cTn id="34" dur="500" fill="hold"/>
+                                        <p:tgtEl>
+                                          <p:spTgt spid="10"/>
+                                        </p:tgtEl>
+                                        <p:attrNameLst>
+                                          <p:attrName>fillcolor</p:attrName>
+                                        </p:attrNameLst>
+                                      </p:cBhvr>
+                                      <p:by>
+                                        <p:hsl h="7200000" s="0" l="0"/>
+                                      </p:by>
+                                    </p:animClr>
+                                    <p:animClr clrSpc="hsl">
+                                      <p:cBhvr>
+                                        <p:cTn id="35" dur="500" fill="hold"/>
+                                        <p:tgtEl>
+                                          <p:spTgt spid="10"/>
+                                        </p:tgtEl>
+                                        <p:attrNameLst>
+                                          <p:attrName>stroke.color</p:attrName>
+                                        </p:attrNameLst>
+                                      </p:cBhvr>
+                                      <p:by>
+                                        <p:hsl h="7200000" s="0" l="0"/>
+                                      </p:by>
+                                    </p:animClr>
+                                    <p:set>
+                                      <p:cBhvr>
+                                        <p:cTn id="36" dur="500" fill="hold"/>
+                                        <p:tgtEl>
+                                          <p:spTgt spid="10"/>
+                                        </p:tgtEl>
+                                        <p:attrNameLst>
+                                          <p:attrName>fill.type</p:attrName>
+                                        </p:attrNameLst>
+                                      </p:cBhvr>
+                                      <p:to>
+                                        <p:strVal val="solid"/>
+                                      </p:to>
+                                    </p:set>
+                                  </p:childTnLst>
+                                </p:cTn>
+                              </p:par>
+                              <p:par>
+                                <p:cTn id="37" presetID="1" presetClass="entr" presetSubtype="0" fill="hold" grpId="0" nodeType="withEffect">
+                                  <p:stCondLst>
+                                    <p:cond delay="0"/>
+                                  </p:stCondLst>
+                                  <p:childTnLst>
+                                    <p:set>
+                                      <p:cBhvr>
+                                        <p:cTn id="38" dur="1" fill="hold">
+                                          <p:stCondLst>
+                                            <p:cond delay="0"/>
+                                          </p:stCondLst>
+                                        </p:cTn>
+                                        <p:tgtEl>
+                                          <p:spTgt spid="25"/>
+                                        </p:tgtEl>
+                                        <p:attrNameLst>
+                                          <p:attrName>style.visibility</p:attrName>
+                                        </p:attrNameLst>
+                                      </p:cBhvr>
+                                      <p:to>
+                                        <p:strVal val="visible"/>
+                                      </p:to>
+                                    </p:set>
+                                  </p:childTnLst>
+                                </p:cTn>
+                              </p:par>
+                            </p:childTnLst>
+                          </p:cTn>
+                        </p:par>
+                      </p:childTnLst>
+                    </p:cTn>
+                  </p:par>
+                  <p:par>
+                    <p:cTn id="39" fill="hold">
+                      <p:stCondLst>
+                        <p:cond delay="indefinite"/>
+                      </p:stCondLst>
+                      <p:childTnLst>
+                        <p:par>
+                          <p:cTn id="40" fill="hold">
+                            <p:stCondLst>
+                              <p:cond delay="0"/>
+                            </p:stCondLst>
+                            <p:childTnLst>
+                              <p:par>
+                                <p:cTn id="41" presetID="21" presetClass="emph" presetSubtype="0" fill="hold" grpId="0" nodeType="clickEffect">
+                                  <p:stCondLst>
+                                    <p:cond delay="0"/>
+                                  </p:stCondLst>
+                                  <p:childTnLst>
+                                    <p:animClr clrSpc="hsl">
+                                      <p:cBhvr override="childStyle">
+                                        <p:cTn id="42" dur="500" fill="hold"/>
+                                        <p:tgtEl>
+                                          <p:spTgt spid="8"/>
+                                        </p:tgtEl>
+                                        <p:attrNameLst>
+                                          <p:attrName>style.color</p:attrName>
+                                        </p:attrNameLst>
+                                      </p:cBhvr>
+                                      <p:by>
+                                        <p:hsl h="7200000" s="0" l="0"/>
+                                      </p:by>
+                                    </p:animClr>
+                                    <p:animClr clrSpc="hsl">
+                                      <p:cBhvr>
+                                        <p:cTn id="43" dur="500" fill="hold"/>
+                                        <p:tgtEl>
+                                          <p:spTgt spid="8"/>
+                                        </p:tgtEl>
+                                        <p:attrNameLst>
+                                          <p:attrName>fillcolor</p:attrName>
+                                        </p:attrNameLst>
+                                      </p:cBhvr>
+                                      <p:by>
+                                        <p:hsl h="7200000" s="0" l="0"/>
+                                      </p:by>
+                                    </p:animClr>
+                                    <p:animClr clrSpc="hsl">
+                                      <p:cBhvr>
+                                        <p:cTn id="44" dur="500" fill="hold"/>
+                                        <p:tgtEl>
+                                          <p:spTgt spid="8"/>
+                                        </p:tgtEl>
+                                        <p:attrNameLst>
+                                          <p:attrName>stroke.color</p:attrName>
+                                        </p:attrNameLst>
+                                      </p:cBhvr>
+                                      <p:by>
+                                        <p:hsl h="7200000" s="0" l="0"/>
+                                      </p:by>
+                                    </p:animClr>
+                                    <p:set>
+                                      <p:cBhvr>
+                                        <p:cTn id="45" dur="500" fill="hold"/>
+                                        <p:tgtEl>
+                                          <p:spTgt spid="8"/>
+                                        </p:tgtEl>
+                                        <p:attrNameLst>
+                                          <p:attrName>fill.type</p:attrName>
+                                        </p:attrNameLst>
+                                      </p:cBhvr>
+                                      <p:to>
+                                        <p:strVal val="solid"/>
+                                      </p:to>
+                                    </p:set>
+                                  </p:childTnLst>
+                                </p:cTn>
+                              </p:par>
+                              <p:par>
+                                <p:cTn id="46" presetID="1" presetClass="entr" presetSubtype="0" fill="hold" grpId="0" nodeType="withEffect">
+                                  <p:stCondLst>
+                                    <p:cond delay="0"/>
+                                  </p:stCondLst>
+                                  <p:childTnLst>
+                                    <p:set>
+                                      <p:cBhvr>
+                                        <p:cTn id="47" dur="1" fill="hold">
+                                          <p:stCondLst>
+                                            <p:cond delay="0"/>
+                                          </p:stCondLst>
+                                        </p:cTn>
+                                        <p:tgtEl>
+                                          <p:spTgt spid="26"/>
+                                        </p:tgtEl>
+                                        <p:attrNameLst>
+                                          <p:attrName>style.visibility</p:attrName>
+                                        </p:attrNameLst>
+                                      </p:cBhvr>
+                                      <p:to>
+                                        <p:strVal val="visible"/>
+                                      </p:to>
+                                    </p:set>
+                                  </p:childTnLst>
+                                </p:cTn>
+                              </p:par>
+                              <p:par>
+                                <p:cTn id="48" presetID="1" presetClass="exit" presetSubtype="0" fill="hold" nodeType="withEffect">
+                                  <p:stCondLst>
+                                    <p:cond delay="0"/>
+                                  </p:stCondLst>
+                                  <p:childTnLst>
+                                    <p:set>
+                                      <p:cBhvr>
+                                        <p:cTn id="49" dur="1" fill="hold">
+                                          <p:stCondLst>
+                                            <p:cond delay="0"/>
+                                          </p:stCondLst>
+                                        </p:cTn>
+                                        <p:tgtEl>
+                                          <p:spTgt spid="14"/>
+                                        </p:tgtEl>
+                                        <p:attrNameLst>
+                                          <p:attrName>style.visibility</p:attrName>
+                                        </p:attrNameLst>
+                                      </p:cBhvr>
+                                      <p:to>
+                                        <p:strVal val="hidden"/>
+                                      </p:to>
+                                    </p:set>
+                                  </p:childTnLst>
+                                </p:cTn>
+                              </p:par>
+                            </p:childTnLst>
+                          </p:cTn>
+                        </p:par>
+                      </p:childTnLst>
+                    </p:cTn>
+                  </p:par>
+                  <p:par>
+                    <p:cTn id="50" fill="hold">
+                      <p:stCondLst>
+                        <p:cond delay="indefinite"/>
+                      </p:stCondLst>
+                      <p:childTnLst>
+                        <p:par>
+                          <p:cTn id="51" fill="hold">
+                            <p:stCondLst>
+                              <p:cond delay="0"/>
+                            </p:stCondLst>
+                            <p:childTnLst>
+                              <p:par>
+                                <p:cTn id="52" presetID="21" presetClass="emph" presetSubtype="0" fill="hold" grpId="1" nodeType="clickEffect">
+                                  <p:stCondLst>
+                                    <p:cond delay="0"/>
+                                  </p:stCondLst>
+                                  <p:childTnLst>
+                                    <p:animClr clrSpc="hsl">
+                                      <p:cBhvr override="childStyle">
+                                        <p:cTn id="53" dur="500" fill="hold"/>
+                                        <p:tgtEl>
+                                          <p:spTgt spid="8"/>
+                                        </p:tgtEl>
+                                        <p:attrNameLst>
+                                          <p:attrName>style.color</p:attrName>
+                                        </p:attrNameLst>
+                                      </p:cBhvr>
+                                      <p:by>
+                                        <p:hsl h="7200000" s="0" l="0"/>
+                                      </p:by>
+                                    </p:animClr>
+                                    <p:animClr clrSpc="hsl">
+                                      <p:cBhvr>
+                                        <p:cTn id="54" dur="500" fill="hold"/>
+                                        <p:tgtEl>
+                                          <p:spTgt spid="8"/>
+                                        </p:tgtEl>
+                                        <p:attrNameLst>
+                                          <p:attrName>fillcolor</p:attrName>
+                                        </p:attrNameLst>
+                                      </p:cBhvr>
+                                      <p:by>
+                                        <p:hsl h="7200000" s="0" l="0"/>
+                                      </p:by>
+                                    </p:animClr>
+                                    <p:animClr clrSpc="hsl">
+                                      <p:cBhvr>
+                                        <p:cTn id="55" dur="500" fill="hold"/>
+                                        <p:tgtEl>
+                                          <p:spTgt spid="8"/>
+                                        </p:tgtEl>
+                                        <p:attrNameLst>
+                                          <p:attrName>stroke.color</p:attrName>
+                                        </p:attrNameLst>
+                                      </p:cBhvr>
+                                      <p:by>
+                                        <p:hsl h="7200000" s="0" l="0"/>
+                                      </p:by>
+                                    </p:animClr>
+                                    <p:set>
+                                      <p:cBhvr>
+                                        <p:cTn id="56" dur="500" fill="hold"/>
+                                        <p:tgtEl>
+                                          <p:spTgt spid="8"/>
+                                        </p:tgtEl>
+                                        <p:attrNameLst>
+                                          <p:attrName>fill.type</p:attrName>
+                                        </p:attrNameLst>
+                                      </p:cBhvr>
+                                      <p:to>
+                                        <p:strVal val="solid"/>
+                                      </p:to>
+                                    </p:set>
+                                  </p:childTnLst>
+                                </p:cTn>
+                              </p:par>
+                            </p:childTnLst>
+                          </p:cTn>
+                        </p:par>
+                      </p:childTnLst>
+                    </p:cTn>
+                  </p:par>
+                  <p:par>
+                    <p:cTn id="57" fill="hold">
+                      <p:stCondLst>
+                        <p:cond delay="indefinite"/>
+                      </p:stCondLst>
+                      <p:childTnLst>
+                        <p:par>
+                          <p:cTn id="58" fill="hold">
+                            <p:stCondLst>
+                              <p:cond delay="0"/>
+                            </p:stCondLst>
+                            <p:childTnLst>
+                              <p:par>
+                                <p:cTn id="59" presetID="21" presetClass="emph" presetSubtype="0" fill="hold" grpId="0" nodeType="clickEffect">
+                                  <p:stCondLst>
+                                    <p:cond delay="0"/>
+                                  </p:stCondLst>
+                                  <p:childTnLst>
+                                    <p:animClr clrSpc="hsl">
+                                      <p:cBhvr override="childStyle">
+                                        <p:cTn id="60" dur="500" fill="hold"/>
+                                        <p:tgtEl>
+                                          <p:spTgt spid="11"/>
+                                        </p:tgtEl>
+                                        <p:attrNameLst>
+                                          <p:attrName>style.color</p:attrName>
+                                        </p:attrNameLst>
+                                      </p:cBhvr>
+                                      <p:by>
+                                        <p:hsl h="7200000" s="0" l="0"/>
+                                      </p:by>
+                                    </p:animClr>
+                                    <p:animClr clrSpc="hsl">
+                                      <p:cBhvr>
+                                        <p:cTn id="61" dur="500" fill="hold"/>
+                                        <p:tgtEl>
+                                          <p:spTgt spid="11"/>
+                                        </p:tgtEl>
+                                        <p:attrNameLst>
+                                          <p:attrName>fillcolor</p:attrName>
+                                        </p:attrNameLst>
+                                      </p:cBhvr>
+                                      <p:by>
+                                        <p:hsl h="7200000" s="0" l="0"/>
+                                      </p:by>
+                                    </p:animClr>
+                                    <p:animClr clrSpc="hsl">
+                                      <p:cBhvr>
+                                        <p:cTn id="62" dur="500" fill="hold"/>
+                                        <p:tgtEl>
+                                          <p:spTgt spid="11"/>
+                                        </p:tgtEl>
+                                        <p:attrNameLst>
+                                          <p:attrName>stroke.color</p:attrName>
+                                        </p:attrNameLst>
+                                      </p:cBhvr>
+                                      <p:by>
+                                        <p:hsl h="7200000" s="0" l="0"/>
+                                      </p:by>
+                                    </p:animClr>
+                                    <p:set>
+                                      <p:cBhvr>
+                                        <p:cTn id="63" dur="500" fill="hold"/>
+                                        <p:tgtEl>
+                                          <p:spTgt spid="11"/>
+                                        </p:tgtEl>
+                                        <p:attrNameLst>
+                                          <p:attrName>fill.type</p:attrName>
+                                        </p:attrNameLst>
+                                      </p:cBhvr>
+                                      <p:to>
+                                        <p:strVal val="solid"/>
+                                      </p:to>
+                                    </p:set>
+                                  </p:childTnLst>
+                                </p:cTn>
+                              </p:par>
+                              <p:par>
+                                <p:cTn id="64" presetID="1" presetClass="entr" presetSubtype="0" fill="hold" grpId="0" nodeType="withEffect">
+                                  <p:stCondLst>
+                                    <p:cond delay="0"/>
+                                  </p:stCondLst>
+                                  <p:childTnLst>
+                                    <p:set>
+                                      <p:cBhvr>
+                                        <p:cTn id="65" dur="1" fill="hold">
+                                          <p:stCondLst>
+                                            <p:cond delay="0"/>
+                                          </p:stCondLst>
+                                        </p:cTn>
+                                        <p:tgtEl>
+                                          <p:spTgt spid="27"/>
+                                        </p:tgtEl>
+                                        <p:attrNameLst>
+                                          <p:attrName>style.visibility</p:attrName>
+                                        </p:attrNameLst>
+                                      </p:cBhvr>
+                                      <p:to>
+                                        <p:strVal val="visible"/>
+                                      </p:to>
+                                    </p:set>
+                                  </p:childTnLst>
+                                </p:cTn>
+                              </p:par>
+                            </p:childTnLst>
+                          </p:cTn>
+                        </p:par>
+                      </p:childTnLst>
+                    </p:cTn>
+                  </p:par>
+                  <p:par>
+                    <p:cTn id="66" fill="hold">
+                      <p:stCondLst>
+                        <p:cond delay="indefinite"/>
+                      </p:stCondLst>
+                      <p:childTnLst>
+                        <p:par>
+                          <p:cTn id="67" fill="hold">
+                            <p:stCondLst>
+                              <p:cond delay="0"/>
+                            </p:stCondLst>
+                            <p:childTnLst>
+                              <p:par>
+                                <p:cTn id="68" presetID="21" presetClass="emph" presetSubtype="0" fill="hold" grpId="0" nodeType="clickEffect">
+                                  <p:stCondLst>
+                                    <p:cond delay="0"/>
+                                  </p:stCondLst>
+                                  <p:childTnLst>
+                                    <p:animClr clrSpc="hsl">
+                                      <p:cBhvr override="childStyle">
+                                        <p:cTn id="69" dur="500" fill="hold"/>
+                                        <p:tgtEl>
+                                          <p:spTgt spid="5"/>
+                                        </p:tgtEl>
+                                        <p:attrNameLst>
+                                          <p:attrName>style.color</p:attrName>
+                                        </p:attrNameLst>
+                                      </p:cBhvr>
+                                      <p:by>
+                                        <p:hsl h="7200000" s="0" l="0"/>
+                                      </p:by>
+                                    </p:animClr>
+                                    <p:animClr clrSpc="hsl">
+                                      <p:cBhvr>
+                                        <p:cTn id="70" dur="500" fill="hold"/>
+                                        <p:tgtEl>
+                                          <p:spTgt spid="5"/>
+                                        </p:tgtEl>
+                                        <p:attrNameLst>
+                                          <p:attrName>fillcolor</p:attrName>
+                                        </p:attrNameLst>
+                                      </p:cBhvr>
+                                      <p:by>
+                                        <p:hsl h="7200000" s="0" l="0"/>
+                                      </p:by>
+                                    </p:animClr>
+                                    <p:animClr clrSpc="hsl">
+                                      <p:cBhvr>
+                                        <p:cTn id="71" dur="500" fill="hold"/>
+                                        <p:tgtEl>
+                                          <p:spTgt spid="5"/>
+                                        </p:tgtEl>
+                                        <p:attrNameLst>
+                                          <p:attrName>stroke.color</p:attrName>
+                                        </p:attrNameLst>
+                                      </p:cBhvr>
+                                      <p:by>
+                                        <p:hsl h="7200000" s="0" l="0"/>
+                                      </p:by>
+                                    </p:animClr>
+                                    <p:set>
+                                      <p:cBhvr>
+                                        <p:cTn id="72" dur="500" fill="hold"/>
+                                        <p:tgtEl>
+                                          <p:spTgt spid="5"/>
+                                        </p:tgtEl>
+                                        <p:attrNameLst>
+                                          <p:attrName>fill.type</p:attrName>
+                                        </p:attrNameLst>
+                                      </p:cBhvr>
+                                      <p:to>
+                                        <p:strVal val="solid"/>
+                                      </p:to>
+                                    </p:set>
+                                  </p:childTnLst>
+                                </p:cTn>
+                              </p:par>
+                              <p:par>
+                                <p:cTn id="73" presetID="1" presetClass="entr" presetSubtype="0" fill="hold" grpId="0" nodeType="withEffect">
+                                  <p:stCondLst>
+                                    <p:cond delay="0"/>
+                                  </p:stCondLst>
+                                  <p:childTnLst>
+                                    <p:set>
+                                      <p:cBhvr>
+                                        <p:cTn id="74" dur="1" fill="hold">
+                                          <p:stCondLst>
+                                            <p:cond delay="0"/>
+                                          </p:stCondLst>
+                                        </p:cTn>
+                                        <p:tgtEl>
+                                          <p:spTgt spid="28"/>
+                                        </p:tgtEl>
+                                        <p:attrNameLst>
+                                          <p:attrName>style.visibility</p:attrName>
+                                        </p:attrNameLst>
+                                      </p:cBhvr>
+                                      <p:to>
+                                        <p:strVal val="visible"/>
+                                      </p:to>
+                                    </p:set>
+                                  </p:childTnLst>
+                                </p:cTn>
+                              </p:par>
+                            </p:childTnLst>
+                          </p:cTn>
+                        </p:par>
+                      </p:childTnLst>
+                    </p:cTn>
+                  </p:par>
+                  <p:par>
+                    <p:cTn id="75" fill="hold">
+                      <p:stCondLst>
+                        <p:cond delay="indefinite"/>
+                      </p:stCondLst>
+                      <p:childTnLst>
+                        <p:par>
+                          <p:cTn id="76" fill="hold">
+                            <p:stCondLst>
+                              <p:cond delay="0"/>
+                            </p:stCondLst>
+                            <p:childTnLst>
+                              <p:par>
+                                <p:cTn id="77" presetID="21" presetClass="emph" presetSubtype="0" fill="hold" grpId="0" nodeType="clickEffect">
+                                  <p:stCondLst>
+                                    <p:cond delay="0"/>
+                                  </p:stCondLst>
+                                  <p:childTnLst>
+                                    <p:animClr clrSpc="hsl">
+                                      <p:cBhvr override="childStyle">
+                                        <p:cTn id="78" dur="500" fill="hold"/>
+                                        <p:tgtEl>
+                                          <p:spTgt spid="6"/>
+                                        </p:tgtEl>
+                                        <p:attrNameLst>
+                                          <p:attrName>style.color</p:attrName>
+                                        </p:attrNameLst>
+                                      </p:cBhvr>
+                                      <p:by>
+                                        <p:hsl h="7200000" s="0" l="0"/>
+                                      </p:by>
+                                    </p:animClr>
+                                    <p:animClr clrSpc="hsl">
+                                      <p:cBhvr>
+                                        <p:cTn id="79" dur="500" fill="hold"/>
+                                        <p:tgtEl>
+                                          <p:spTgt spid="6"/>
+                                        </p:tgtEl>
+                                        <p:attrNameLst>
+                                          <p:attrName>fillcolor</p:attrName>
+                                        </p:attrNameLst>
+                                      </p:cBhvr>
+                                      <p:by>
+                                        <p:hsl h="7200000" s="0" l="0"/>
+                                      </p:by>
+                                    </p:animClr>
+                                    <p:animClr clrSpc="hsl">
+                                      <p:cBhvr>
+                                        <p:cTn id="80" dur="500" fill="hold"/>
+                                        <p:tgtEl>
+                                          <p:spTgt spid="6"/>
+                                        </p:tgtEl>
+                                        <p:attrNameLst>
+                                          <p:attrName>stroke.color</p:attrName>
+                                        </p:attrNameLst>
+                                      </p:cBhvr>
+                                      <p:by>
+                                        <p:hsl h="7200000" s="0" l="0"/>
+                                      </p:by>
+                                    </p:animClr>
+                                    <p:set>
+                                      <p:cBhvr>
+                                        <p:cTn id="81" dur="500" fill="hold"/>
+                                        <p:tgtEl>
+                                          <p:spTgt spid="6"/>
+                                        </p:tgtEl>
+                                        <p:attrNameLst>
+                                          <p:attrName>fill.type</p:attrName>
+                                        </p:attrNameLst>
+                                      </p:cBhvr>
+                                      <p:to>
+                                        <p:strVal val="solid"/>
+                                      </p:to>
+                                    </p:set>
+                                  </p:childTnLst>
+                                </p:cTn>
+                              </p:par>
+                              <p:par>
+                                <p:cTn id="82" presetID="1" presetClass="entr" presetSubtype="0" fill="hold" grpId="0" nodeType="withEffect">
+                                  <p:stCondLst>
+                                    <p:cond delay="0"/>
+                                  </p:stCondLst>
+                                  <p:childTnLst>
+                                    <p:set>
+                                      <p:cBhvr>
+                                        <p:cTn id="83" dur="1" fill="hold">
+                                          <p:stCondLst>
+                                            <p:cond delay="0"/>
+                                          </p:stCondLst>
+                                        </p:cTn>
+                                        <p:tgtEl>
+                                          <p:spTgt spid="32"/>
+                                        </p:tgtEl>
+                                        <p:attrNameLst>
+                                          <p:attrName>style.visibility</p:attrName>
+                                        </p:attrNameLst>
+                                      </p:cBhvr>
+                                      <p:to>
+                                        <p:strVal val="visible"/>
+                                      </p:to>
+                                    </p:set>
+                                  </p:childTnLst>
+                                </p:cTn>
+                              </p:par>
+                            </p:childTnLst>
+                          </p:cTn>
+                        </p:par>
+                      </p:childTnLst>
+                    </p:cTn>
+                  </p:par>
+                  <p:par>
+                    <p:cTn id="84" fill="hold">
+                      <p:stCondLst>
+                        <p:cond delay="indefinite"/>
+                      </p:stCondLst>
+                      <p:childTnLst>
+                        <p:par>
+                          <p:cTn id="85" fill="hold">
+                            <p:stCondLst>
+                              <p:cond delay="0"/>
+                            </p:stCondLst>
+                            <p:childTnLst>
+                              <p:par>
+                                <p:cTn id="86" presetID="21" presetClass="emph" presetSubtype="0" fill="hold" grpId="1" nodeType="clickEffect">
+                                  <p:stCondLst>
+                                    <p:cond delay="0"/>
+                                  </p:stCondLst>
+                                  <p:childTnLst>
+                                    <p:animClr clrSpc="hsl">
+                                      <p:cBhvr override="childStyle">
+                                        <p:cTn id="87" dur="500" fill="hold"/>
+                                        <p:tgtEl>
+                                          <p:spTgt spid="6"/>
+                                        </p:tgtEl>
+                                        <p:attrNameLst>
+                                          <p:attrName>style.color</p:attrName>
+                                        </p:attrNameLst>
+                                      </p:cBhvr>
+                                      <p:by>
+                                        <p:hsl h="7200000" s="0" l="0"/>
+                                      </p:by>
+                                    </p:animClr>
+                                    <p:animClr clrSpc="hsl">
+                                      <p:cBhvr>
+                                        <p:cTn id="88" dur="500" fill="hold"/>
+                                        <p:tgtEl>
+                                          <p:spTgt spid="6"/>
+                                        </p:tgtEl>
+                                        <p:attrNameLst>
+                                          <p:attrName>fillcolor</p:attrName>
+                                        </p:attrNameLst>
+                                      </p:cBhvr>
+                                      <p:by>
+                                        <p:hsl h="7200000" s="0" l="0"/>
+                                      </p:by>
+                                    </p:animClr>
+                                    <p:animClr clrSpc="hsl">
+                                      <p:cBhvr>
+                                        <p:cTn id="89" dur="500" fill="hold"/>
+                                        <p:tgtEl>
+                                          <p:spTgt spid="6"/>
+                                        </p:tgtEl>
+                                        <p:attrNameLst>
+                                          <p:attrName>stroke.color</p:attrName>
+                                        </p:attrNameLst>
+                                      </p:cBhvr>
+                                      <p:by>
+                                        <p:hsl h="7200000" s="0" l="0"/>
+                                      </p:by>
+                                    </p:animClr>
+                                    <p:set>
+                                      <p:cBhvr>
+                                        <p:cTn id="90" dur="500" fill="hold"/>
+                                        <p:tgtEl>
+                                          <p:spTgt spid="6"/>
+                                        </p:tgtEl>
+                                        <p:attrNameLst>
+                                          <p:attrName>fill.type</p:attrName>
+                                        </p:attrNameLst>
+                                      </p:cBhvr>
+                                      <p:to>
+                                        <p:strVal val="solid"/>
+                                      </p:to>
+                                    </p:set>
+                                  </p:childTnLst>
+                                </p:cTn>
+                              </p:par>
+                            </p:childTnLst>
+                          </p:cTn>
+                        </p:par>
+                      </p:childTnLst>
+                    </p:cTn>
+                  </p:par>
+                  <p:par>
+                    <p:cTn id="91" fill="hold">
+                      <p:stCondLst>
+                        <p:cond delay="indefinite"/>
+                      </p:stCondLst>
+                      <p:childTnLst>
+                        <p:par>
+                          <p:cTn id="92" fill="hold">
+                            <p:stCondLst>
+                              <p:cond delay="0"/>
+                            </p:stCondLst>
+                            <p:childTnLst>
+                              <p:par>
+                                <p:cTn id="93" presetID="21" presetClass="emph" presetSubtype="0" fill="hold" grpId="1" nodeType="clickEffect">
+                                  <p:stCondLst>
+                                    <p:cond delay="0"/>
+                                  </p:stCondLst>
+                                  <p:childTnLst>
+                                    <p:animClr clrSpc="hsl">
+                                      <p:cBhvr override="childStyle">
+                                        <p:cTn id="94" dur="500" fill="hold"/>
+                                        <p:tgtEl>
+                                          <p:spTgt spid="5"/>
+                                        </p:tgtEl>
+                                        <p:attrNameLst>
+                                          <p:attrName>style.color</p:attrName>
+                                        </p:attrNameLst>
+                                      </p:cBhvr>
+                                      <p:by>
+                                        <p:hsl h="7200000" s="0" l="0"/>
+                                      </p:by>
+                                    </p:animClr>
+                                    <p:animClr clrSpc="hsl">
+                                      <p:cBhvr>
+                                        <p:cTn id="95" dur="500" fill="hold"/>
+                                        <p:tgtEl>
+                                          <p:spTgt spid="5"/>
+                                        </p:tgtEl>
+                                        <p:attrNameLst>
+                                          <p:attrName>fillcolor</p:attrName>
+                                        </p:attrNameLst>
+                                      </p:cBhvr>
+                                      <p:by>
+                                        <p:hsl h="7200000" s="0" l="0"/>
+                                      </p:by>
+                                    </p:animClr>
+                                    <p:animClr clrSpc="hsl">
+                                      <p:cBhvr>
+                                        <p:cTn id="96" dur="500" fill="hold"/>
+                                        <p:tgtEl>
+                                          <p:spTgt spid="5"/>
+                                        </p:tgtEl>
+                                        <p:attrNameLst>
+                                          <p:attrName>stroke.color</p:attrName>
+                                        </p:attrNameLst>
+                                      </p:cBhvr>
+                                      <p:by>
+                                        <p:hsl h="7200000" s="0" l="0"/>
+                                      </p:by>
+                                    </p:animClr>
+                                    <p:set>
+                                      <p:cBhvr>
+                                        <p:cTn id="97" dur="500" fill="hold"/>
+                                        <p:tgtEl>
+                                          <p:spTgt spid="5"/>
+                                        </p:tgtEl>
+                                        <p:attrNameLst>
+                                          <p:attrName>fill.type</p:attrName>
+                                        </p:attrNameLst>
+                                      </p:cBhvr>
+                                      <p:to>
+                                        <p:strVal val="solid"/>
+                                      </p:to>
+                                    </p:set>
+                                  </p:childTnLst>
+                                </p:cTn>
+                              </p:par>
+                            </p:childTnLst>
+                          </p:cTn>
+                        </p:par>
+                      </p:childTnLst>
+                    </p:cTn>
+                  </p:par>
+                  <p:par>
+                    <p:cTn id="98" fill="hold">
+                      <p:stCondLst>
+                        <p:cond delay="indefinite"/>
+                      </p:stCondLst>
+                      <p:childTnLst>
+                        <p:par>
+                          <p:cTn id="99" fill="hold">
+                            <p:stCondLst>
+                              <p:cond delay="0"/>
+                            </p:stCondLst>
+                            <p:childTnLst>
+                              <p:par>
+                                <p:cTn id="100" presetID="21" presetClass="emph" presetSubtype="0" fill="hold" grpId="1" nodeType="clickEffect">
+                                  <p:stCondLst>
+                                    <p:cond delay="0"/>
+                                  </p:stCondLst>
+                                  <p:childTnLst>
+                                    <p:animClr clrSpc="hsl">
+                                      <p:cBhvr override="childStyle">
+                                        <p:cTn id="101" dur="500" fill="hold"/>
+                                        <p:tgtEl>
+                                          <p:spTgt spid="11"/>
+                                        </p:tgtEl>
+                                        <p:attrNameLst>
+                                          <p:attrName>style.color</p:attrName>
+                                        </p:attrNameLst>
+                                      </p:cBhvr>
+                                      <p:by>
+                                        <p:hsl h="7200000" s="0" l="0"/>
+                                      </p:by>
+                                    </p:animClr>
+                                    <p:animClr clrSpc="hsl">
+                                      <p:cBhvr>
+                                        <p:cTn id="102" dur="500" fill="hold"/>
+                                        <p:tgtEl>
+                                          <p:spTgt spid="11"/>
+                                        </p:tgtEl>
+                                        <p:attrNameLst>
+                                          <p:attrName>fillcolor</p:attrName>
+                                        </p:attrNameLst>
+                                      </p:cBhvr>
+                                      <p:by>
+                                        <p:hsl h="7200000" s="0" l="0"/>
+                                      </p:by>
+                                    </p:animClr>
+                                    <p:animClr clrSpc="hsl">
+                                      <p:cBhvr>
+                                        <p:cTn id="103" dur="500" fill="hold"/>
+                                        <p:tgtEl>
+                                          <p:spTgt spid="11"/>
+                                        </p:tgtEl>
+                                        <p:attrNameLst>
+                                          <p:attrName>stroke.color</p:attrName>
+                                        </p:attrNameLst>
+                                      </p:cBhvr>
+                                      <p:by>
+                                        <p:hsl h="7200000" s="0" l="0"/>
+                                      </p:by>
+                                    </p:animClr>
+                                    <p:set>
+                                      <p:cBhvr>
+                                        <p:cTn id="104" dur="500" fill="hold"/>
+                                        <p:tgtEl>
+                                          <p:spTgt spid="11"/>
+                                        </p:tgtEl>
+                                        <p:attrNameLst>
+                                          <p:attrName>fill.type</p:attrName>
+                                        </p:attrNameLst>
+                                      </p:cBhvr>
+                                      <p:to>
+                                        <p:strVal val="solid"/>
+                                      </p:to>
+                                    </p:set>
+                                  </p:childTnLst>
+                                </p:cTn>
+                              </p:par>
+                            </p:childTnLst>
+                          </p:cTn>
+                        </p:par>
+                      </p:childTnLst>
+                    </p:cTn>
+                  </p:par>
+                  <p:par>
+                    <p:cTn id="105" fill="hold">
+                      <p:stCondLst>
+                        <p:cond delay="indefinite"/>
+                      </p:stCondLst>
+                      <p:childTnLst>
+                        <p:par>
+                          <p:cTn id="106" fill="hold">
+                            <p:stCondLst>
+                              <p:cond delay="0"/>
+                            </p:stCondLst>
+                            <p:childTnLst>
+                              <p:par>
+                                <p:cTn id="107" presetID="21" presetClass="emph" presetSubtype="0" fill="hold" grpId="0" nodeType="clickEffect">
+                                  <p:stCondLst>
+                                    <p:cond delay="0"/>
+                                  </p:stCondLst>
+                                  <p:childTnLst>
+                                    <p:animClr clrSpc="hsl">
+                                      <p:cBhvr override="childStyle">
+                                        <p:cTn id="108" dur="500" fill="hold"/>
+                                        <p:tgtEl>
+                                          <p:spTgt spid="12"/>
+                                        </p:tgtEl>
+                                        <p:attrNameLst>
+                                          <p:attrName>style.color</p:attrName>
+                                        </p:attrNameLst>
+                                      </p:cBhvr>
+                                      <p:by>
+                                        <p:hsl h="7200000" s="0" l="0"/>
+                                      </p:by>
+                                    </p:animClr>
+                                    <p:animClr clrSpc="hsl">
+                                      <p:cBhvr>
+                                        <p:cTn id="109" dur="500" fill="hold"/>
+                                        <p:tgtEl>
+                                          <p:spTgt spid="12"/>
+                                        </p:tgtEl>
+                                        <p:attrNameLst>
+                                          <p:attrName>fillcolor</p:attrName>
+                                        </p:attrNameLst>
+                                      </p:cBhvr>
+                                      <p:by>
+                                        <p:hsl h="7200000" s="0" l="0"/>
+                                      </p:by>
+                                    </p:animClr>
+                                    <p:animClr clrSpc="hsl">
+                                      <p:cBhvr>
+                                        <p:cTn id="110" dur="500" fill="hold"/>
+                                        <p:tgtEl>
+                                          <p:spTgt spid="12"/>
+                                        </p:tgtEl>
+                                        <p:attrNameLst>
+                                          <p:attrName>stroke.color</p:attrName>
+                                        </p:attrNameLst>
+                                      </p:cBhvr>
+                                      <p:by>
+                                        <p:hsl h="7200000" s="0" l="0"/>
+                                      </p:by>
+                                    </p:animClr>
+                                    <p:set>
+                                      <p:cBhvr>
+                                        <p:cTn id="111" dur="500" fill="hold"/>
+                                        <p:tgtEl>
+                                          <p:spTgt spid="12"/>
+                                        </p:tgtEl>
+                                        <p:attrNameLst>
+                                          <p:attrName>fill.type</p:attrName>
+                                        </p:attrNameLst>
+                                      </p:cBhvr>
+                                      <p:to>
+                                        <p:strVal val="solid"/>
+                                      </p:to>
+                                    </p:set>
+                                  </p:childTnLst>
+                                </p:cTn>
+                              </p:par>
+                              <p:par>
+                                <p:cTn id="112" presetID="1" presetClass="entr" presetSubtype="0" fill="hold" grpId="0" nodeType="withEffect">
+                                  <p:stCondLst>
+                                    <p:cond delay="0"/>
+                                  </p:stCondLst>
+                                  <p:childTnLst>
+                                    <p:set>
+                                      <p:cBhvr>
+                                        <p:cTn id="113" dur="1" fill="hold">
+                                          <p:stCondLst>
+                                            <p:cond delay="0"/>
+                                          </p:stCondLst>
+                                        </p:cTn>
+                                        <p:tgtEl>
+                                          <p:spTgt spid="33"/>
+                                        </p:tgtEl>
+                                        <p:attrNameLst>
+                                          <p:attrName>style.visibility</p:attrName>
+                                        </p:attrNameLst>
+                                      </p:cBhvr>
+                                      <p:to>
+                                        <p:strVal val="visible"/>
+                                      </p:to>
+                                    </p:set>
+                                  </p:childTnLst>
+                                </p:cTn>
+                              </p:par>
+                            </p:childTnLst>
+                          </p:cTn>
+                        </p:par>
+                      </p:childTnLst>
+                    </p:cTn>
+                  </p:par>
+                  <p:par>
+                    <p:cTn id="114" fill="hold">
+                      <p:stCondLst>
+                        <p:cond delay="indefinite"/>
+                      </p:stCondLst>
+                      <p:childTnLst>
+                        <p:par>
+                          <p:cTn id="115" fill="hold">
+                            <p:stCondLst>
+                              <p:cond delay="0"/>
+                            </p:stCondLst>
+                            <p:childTnLst>
+                              <p:par>
+                                <p:cTn id="116" presetID="21" presetClass="emph" presetSubtype="0" fill="hold" grpId="1" nodeType="clickEffect">
+                                  <p:stCondLst>
+                                    <p:cond delay="0"/>
+                                  </p:stCondLst>
+                                  <p:childTnLst>
+                                    <p:animClr clrSpc="hsl">
+                                      <p:cBhvr override="childStyle">
+                                        <p:cTn id="117" dur="500" fill="hold"/>
+                                        <p:tgtEl>
+                                          <p:spTgt spid="12"/>
+                                        </p:tgtEl>
+                                        <p:attrNameLst>
+                                          <p:attrName>style.color</p:attrName>
+                                        </p:attrNameLst>
+                                      </p:cBhvr>
+                                      <p:by>
+                                        <p:hsl h="7200000" s="0" l="0"/>
+                                      </p:by>
+                                    </p:animClr>
+                                    <p:animClr clrSpc="hsl">
+                                      <p:cBhvr>
+                                        <p:cTn id="118" dur="500" fill="hold"/>
+                                        <p:tgtEl>
+                                          <p:spTgt spid="12"/>
+                                        </p:tgtEl>
+                                        <p:attrNameLst>
+                                          <p:attrName>fillcolor</p:attrName>
+                                        </p:attrNameLst>
+                                      </p:cBhvr>
+                                      <p:by>
+                                        <p:hsl h="7200000" s="0" l="0"/>
+                                      </p:by>
+                                    </p:animClr>
+                                    <p:animClr clrSpc="hsl">
+                                      <p:cBhvr>
+                                        <p:cTn id="119" dur="500" fill="hold"/>
+                                        <p:tgtEl>
+                                          <p:spTgt spid="12"/>
+                                        </p:tgtEl>
+                                        <p:attrNameLst>
+                                          <p:attrName>stroke.color</p:attrName>
+                                        </p:attrNameLst>
+                                      </p:cBhvr>
+                                      <p:by>
+                                        <p:hsl h="7200000" s="0" l="0"/>
+                                      </p:by>
+                                    </p:animClr>
+                                    <p:set>
+                                      <p:cBhvr>
+                                        <p:cTn id="120" dur="500" fill="hold"/>
+                                        <p:tgtEl>
+                                          <p:spTgt spid="12"/>
+                                        </p:tgtEl>
+                                        <p:attrNameLst>
+                                          <p:attrName>fill.type</p:attrName>
+                                        </p:attrNameLst>
+                                      </p:cBhvr>
+                                      <p:to>
+                                        <p:strVal val="solid"/>
+                                      </p:to>
+                                    </p:set>
+                                  </p:childTnLst>
+                                </p:cTn>
+                              </p:par>
+                            </p:childTnLst>
+                          </p:cTn>
+                        </p:par>
+                      </p:childTnLst>
+                    </p:cTn>
+                  </p:par>
+                  <p:par>
+                    <p:cTn id="121" fill="hold">
+                      <p:stCondLst>
+                        <p:cond delay="indefinite"/>
+                      </p:stCondLst>
+                      <p:childTnLst>
+                        <p:par>
+                          <p:cTn id="122" fill="hold">
+                            <p:stCondLst>
+                              <p:cond delay="0"/>
+                            </p:stCondLst>
+                            <p:childTnLst>
+                              <p:par>
+                                <p:cTn id="123" presetID="21" presetClass="emph" presetSubtype="0" fill="hold" grpId="1" nodeType="clickEffect">
+                                  <p:stCondLst>
+                                    <p:cond delay="0"/>
+                                  </p:stCondLst>
+                                  <p:childTnLst>
+                                    <p:animClr clrSpc="hsl">
+                                      <p:cBhvr override="childStyle">
+                                        <p:cTn id="124" dur="500" fill="hold"/>
+                                        <p:tgtEl>
+                                          <p:spTgt spid="10"/>
+                                        </p:tgtEl>
+                                        <p:attrNameLst>
+                                          <p:attrName>style.color</p:attrName>
+                                        </p:attrNameLst>
+                                      </p:cBhvr>
+                                      <p:by>
+                                        <p:hsl h="7200000" s="0" l="0"/>
+                                      </p:by>
+                                    </p:animClr>
+                                    <p:animClr clrSpc="hsl">
+                                      <p:cBhvr>
+                                        <p:cTn id="125" dur="500" fill="hold"/>
+                                        <p:tgtEl>
+                                          <p:spTgt spid="10"/>
+                                        </p:tgtEl>
+                                        <p:attrNameLst>
+                                          <p:attrName>fillcolor</p:attrName>
+                                        </p:attrNameLst>
+                                      </p:cBhvr>
+                                      <p:by>
+                                        <p:hsl h="7200000" s="0" l="0"/>
+                                      </p:by>
+                                    </p:animClr>
+                                    <p:animClr clrSpc="hsl">
+                                      <p:cBhvr>
+                                        <p:cTn id="126" dur="500" fill="hold"/>
+                                        <p:tgtEl>
+                                          <p:spTgt spid="10"/>
+                                        </p:tgtEl>
+                                        <p:attrNameLst>
+                                          <p:attrName>stroke.color</p:attrName>
+                                        </p:attrNameLst>
+                                      </p:cBhvr>
+                                      <p:by>
+                                        <p:hsl h="7200000" s="0" l="0"/>
+                                      </p:by>
+                                    </p:animClr>
+                                    <p:set>
+                                      <p:cBhvr>
+                                        <p:cTn id="127" dur="500" fill="hold"/>
+                                        <p:tgtEl>
+                                          <p:spTgt spid="10"/>
+                                        </p:tgtEl>
+                                        <p:attrNameLst>
+                                          <p:attrName>fill.type</p:attrName>
+                                        </p:attrNameLst>
+                                      </p:cBhvr>
+                                      <p:to>
+                                        <p:strVal val="solid"/>
+                                      </p:to>
+                                    </p:set>
+                                  </p:childTnLst>
+                                </p:cTn>
+                              </p:par>
+                            </p:childTnLst>
+                          </p:cTn>
+                        </p:par>
+                      </p:childTnLst>
+                    </p:cTn>
+                  </p:par>
+                  <p:par>
+                    <p:cTn id="128" fill="hold">
+                      <p:stCondLst>
+                        <p:cond delay="indefinite"/>
+                      </p:stCondLst>
+                      <p:childTnLst>
+                        <p:par>
+                          <p:cTn id="129" fill="hold">
+                            <p:stCondLst>
+                              <p:cond delay="0"/>
+                            </p:stCondLst>
+                            <p:childTnLst>
+                              <p:par>
+                                <p:cTn id="130" presetID="21" presetClass="emph" presetSubtype="0" fill="hold" grpId="1" nodeType="clickEffect">
+                                  <p:stCondLst>
+                                    <p:cond delay="0"/>
+                                  </p:stCondLst>
+                                  <p:childTnLst>
+                                    <p:animClr clrSpc="hsl">
+                                      <p:cBhvr override="childStyle">
+                                        <p:cTn id="131" dur="500" fill="hold"/>
+                                        <p:tgtEl>
+                                          <p:spTgt spid="4"/>
+                                        </p:tgtEl>
+                                        <p:attrNameLst>
+                                          <p:attrName>style.color</p:attrName>
+                                        </p:attrNameLst>
+                                      </p:cBhvr>
+                                      <p:by>
+                                        <p:hsl h="7200000" s="0" l="0"/>
+                                      </p:by>
+                                    </p:animClr>
+                                    <p:animClr clrSpc="hsl">
+                                      <p:cBhvr>
+                                        <p:cTn id="132" dur="500" fill="hold"/>
+                                        <p:tgtEl>
+                                          <p:spTgt spid="4"/>
+                                        </p:tgtEl>
+                                        <p:attrNameLst>
+                                          <p:attrName>fillcolor</p:attrName>
+                                        </p:attrNameLst>
+                                      </p:cBhvr>
+                                      <p:by>
+                                        <p:hsl h="7200000" s="0" l="0"/>
+                                      </p:by>
+                                    </p:animClr>
+                                    <p:animClr clrSpc="hsl">
+                                      <p:cBhvr>
+                                        <p:cTn id="133" dur="500" fill="hold"/>
+                                        <p:tgtEl>
+                                          <p:spTgt spid="4"/>
+                                        </p:tgtEl>
+                                        <p:attrNameLst>
+                                          <p:attrName>stroke.color</p:attrName>
+                                        </p:attrNameLst>
+                                      </p:cBhvr>
+                                      <p:by>
+                                        <p:hsl h="7200000" s="0" l="0"/>
+                                      </p:by>
+                                    </p:animClr>
+                                    <p:set>
+                                      <p:cBhvr>
+                                        <p:cTn id="134" dur="500" fill="hold"/>
+                                        <p:tgtEl>
+                                          <p:spTgt spid="4"/>
+                                        </p:tgtEl>
+                                        <p:attrNameLst>
+                                          <p:attrName>fill.type</p:attrName>
+                                        </p:attrNameLst>
+                                      </p:cBhvr>
+                                      <p:to>
+                                        <p:strVal val="solid"/>
+                                      </p:to>
+                                    </p:set>
+                                  </p:childTnLst>
+                                </p:cTn>
+                              </p:par>
+                            </p:childTnLst>
+                          </p:cTn>
+                        </p:par>
+                      </p:childTnLst>
+                    </p:cTn>
+                  </p:par>
+                  <p:par>
+                    <p:cTn id="135" fill="hold">
+                      <p:stCondLst>
+                        <p:cond delay="indefinite"/>
+                      </p:stCondLst>
+                      <p:childTnLst>
+                        <p:par>
+                          <p:cTn id="136" fill="hold">
+                            <p:stCondLst>
+                              <p:cond delay="0"/>
+                            </p:stCondLst>
+                            <p:childTnLst>
+                              <p:par>
+                                <p:cTn id="137" presetID="21" presetClass="emph" presetSubtype="0" fill="hold" grpId="1" nodeType="clickEffect">
+                                  <p:stCondLst>
+                                    <p:cond delay="0"/>
+                                  </p:stCondLst>
+                                  <p:childTnLst>
+                                    <p:animClr clrSpc="hsl">
+                                      <p:cBhvr override="childStyle">
+                                        <p:cTn id="138" dur="500" fill="hold"/>
+                                        <p:tgtEl>
+                                          <p:spTgt spid="7"/>
+                                        </p:tgtEl>
+                                        <p:attrNameLst>
+                                          <p:attrName>style.color</p:attrName>
+                                        </p:attrNameLst>
+                                      </p:cBhvr>
+                                      <p:by>
+                                        <p:hsl h="7200000" s="0" l="0"/>
+                                      </p:by>
+                                    </p:animClr>
+                                    <p:animClr clrSpc="hsl">
+                                      <p:cBhvr>
+                                        <p:cTn id="139" dur="500" fill="hold"/>
+                                        <p:tgtEl>
+                                          <p:spTgt spid="7"/>
+                                        </p:tgtEl>
+                                        <p:attrNameLst>
+                                          <p:attrName>fillcolor</p:attrName>
+                                        </p:attrNameLst>
+                                      </p:cBhvr>
+                                      <p:by>
+                                        <p:hsl h="7200000" s="0" l="0"/>
+                                      </p:by>
+                                    </p:animClr>
+                                    <p:animClr clrSpc="hsl">
+                                      <p:cBhvr>
+                                        <p:cTn id="140" dur="500" fill="hold"/>
+                                        <p:tgtEl>
+                                          <p:spTgt spid="7"/>
+                                        </p:tgtEl>
+                                        <p:attrNameLst>
+                                          <p:attrName>stroke.color</p:attrName>
+                                        </p:attrNameLst>
+                                      </p:cBhvr>
+                                      <p:by>
+                                        <p:hsl h="7200000" s="0" l="0"/>
+                                      </p:by>
+                                    </p:animClr>
+                                    <p:set>
+                                      <p:cBhvr>
+                                        <p:cTn id="141" dur="500" fill="hold"/>
+                                        <p:tgtEl>
+                                          <p:spTgt spid="7"/>
+                                        </p:tgtEl>
+                                        <p:attrNameLst>
+                                          <p:attrName>fill.type</p:attrName>
+                                        </p:attrNameLst>
+                                      </p:cBhvr>
+                                      <p:to>
+                                        <p:strVal val="solid"/>
+                                      </p:to>
+                                    </p:set>
+                                  </p:childTnLst>
+                                </p:cTn>
+                              </p:par>
+                            </p:childTnLst>
+                          </p:cTn>
+                        </p:par>
+                      </p:childTnLst>
+                    </p:cTn>
+                  </p:par>
+                  <p:par>
+                    <p:cTn id="142" fill="hold">
+                      <p:stCondLst>
+                        <p:cond delay="indefinite"/>
+                      </p:stCondLst>
+                      <p:childTnLst>
+                        <p:par>
+                          <p:cTn id="143" fill="hold">
+                            <p:stCondLst>
+                              <p:cond delay="0"/>
+                            </p:stCondLst>
+                            <p:childTnLst>
+                              <p:par>
+                                <p:cTn id="144" presetID="21" presetClass="emph" presetSubtype="0" fill="hold" grpId="1" nodeType="clickEffect">
+                                  <p:stCondLst>
+                                    <p:cond delay="0"/>
+                                  </p:stCondLst>
+                                  <p:childTnLst>
+                                    <p:animClr clrSpc="hsl">
+                                      <p:cBhvr override="childStyle">
+                                        <p:cTn id="145" dur="500" fill="hold"/>
+                                        <p:tgtEl>
+                                          <p:spTgt spid="9"/>
+                                        </p:tgtEl>
+                                        <p:attrNameLst>
+                                          <p:attrName>style.color</p:attrName>
+                                        </p:attrNameLst>
+                                      </p:cBhvr>
+                                      <p:by>
+                                        <p:hsl h="7200000" s="0" l="0"/>
+                                      </p:by>
+                                    </p:animClr>
+                                    <p:animClr clrSpc="hsl">
+                                      <p:cBhvr>
+                                        <p:cTn id="146" dur="500" fill="hold"/>
+                                        <p:tgtEl>
+                                          <p:spTgt spid="9"/>
+                                        </p:tgtEl>
+                                        <p:attrNameLst>
+                                          <p:attrName>fillcolor</p:attrName>
+                                        </p:attrNameLst>
+                                      </p:cBhvr>
+                                      <p:by>
+                                        <p:hsl h="7200000" s="0" l="0"/>
+                                      </p:by>
+                                    </p:animClr>
+                                    <p:animClr clrSpc="hsl">
+                                      <p:cBhvr>
+                                        <p:cTn id="147" dur="500" fill="hold"/>
+                                        <p:tgtEl>
+                                          <p:spTgt spid="9"/>
+                                        </p:tgtEl>
+                                        <p:attrNameLst>
+                                          <p:attrName>stroke.color</p:attrName>
+                                        </p:attrNameLst>
+                                      </p:cBhvr>
+                                      <p:by>
+                                        <p:hsl h="7200000" s="0" l="0"/>
+                                      </p:by>
+                                    </p:animClr>
+                                    <p:set>
+                                      <p:cBhvr>
+                                        <p:cTn id="148" dur="500" fill="hold"/>
+                                        <p:tgtEl>
+                                          <p:spTgt spid="9"/>
+                                        </p:tgtEl>
+                                        <p:attrNameLst>
+                                          <p:attrName>fill.type</p:attrName>
+                                        </p:attrNameLst>
+                                      </p:cBhvr>
+                                      <p:to>
+                                        <p:strVal val="solid"/>
+                                      </p:to>
+                                    </p:set>
+                                  </p:childTnLst>
+                                </p:cTn>
+                              </p:par>
+                            </p:childTnLst>
+                          </p:cTn>
+                        </p:par>
+                      </p:childTnLst>
+                    </p:cTn>
+                  </p:par>
+                </p:childTnLst>
+              </p:cTn>
+              <p:prevCondLst>
+                <p:cond evt="onPrev" delay="0">
+                  <p:tgtEl>
+                    <p:sldTgt/>
+                  </p:tgtEl>
+                </p:cond>
+              </p:prevCondLst>
+              <p:nextCondLst>
+                <p:cond evt="onNext" delay="0">
+                  <p:tgtEl>
+                    <p:sldTgt/>
+                  </p:tgtEl>
+                </p:cond>
+              </p:nextCondLst>
+            </p:seq>
+          </p:childTnLst>
+        </p:cTn>
+      </p:par>
+    </p:tnLst>
+    <p:bldLst>
+      <p:bldP spid="4" grpId="0" animBg="1"/>
+      <p:bldP spid="4" grpId="1" animBg="1"/>
+      <p:bldP spid="5" grpId="0" animBg="1"/>
+      <p:bldP spid="5" grpId="1" animBg="1"/>
+      <p:bldP spid="6" grpId="0" animBg="1"/>
+      <p:bldP spid="6" grpId="1" animBg="1"/>
+      <p:bldP spid="7" grpId="0" animBg="1"/>
+      <p:bldP spid="7" grpId="1" animBg="1"/>
+      <p:bldP spid="8" grpId="0" animBg="1"/>
+      <p:bldP spid="8" grpId="1" animBg="1"/>
+      <p:bldP spid="9" grpId="0" animBg="1"/>
+      <p:bldP spid="9" grpId="1" animBg="1"/>
+      <p:bldP spid="10" grpId="0" animBg="1"/>
+      <p:bldP spid="10" grpId="1" animBg="1"/>
+      <p:bldP spid="11" grpId="0" animBg="1"/>
+      <p:bldP spid="11" grpId="1" animBg="1"/>
+      <p:bldP spid="12" grpId="0" animBg="1"/>
+      <p:bldP spid="12" grpId="1" animBg="1"/>
+      <p:bldP spid="22" grpId="0"/>
+      <p:bldP spid="23" grpId="0"/>
+      <p:bldP spid="24" grpId="0"/>
+      <p:bldP spid="25" grpId="0"/>
+      <p:bldP spid="26" grpId="0"/>
+      <p:bldP spid="27" grpId="0"/>
+      <p:bldP spid="28" grpId="0"/>
+      <p:bldP spid="32" grpId="0"/>
+      <p:bldP spid="33" grpId="0"/>
+    </p:bldLst>
+  </p:timing>
+</p:sld>
+</file>
+
 <file path=ppt/theme/theme1.xml><?xml version="1.0" encoding="utf-8"?>
 <a:theme xmlns:a="http://schemas.openxmlformats.org/drawingml/2006/main" name="Solstice">
   <a:themeElements>

</xml_diff>